<commit_message>
maj plan du site
</commit_message>
<xml_diff>
--- a/maquettes/plan du site.pptx
+++ b/maquettes/plan du site.pptx
@@ -5,19 +5,22 @@
     <p:sldMasterId id="2147483648" r:id="rId1"/>
   </p:sldMasterIdLst>
   <p:sldIdLst>
-    <p:sldId id="257" r:id="rId2"/>
-    <p:sldId id="258" r:id="rId3"/>
-    <p:sldId id="259" r:id="rId4"/>
-    <p:sldId id="260" r:id="rId5"/>
-    <p:sldId id="261" r:id="rId6"/>
-    <p:sldId id="262" r:id="rId7"/>
-    <p:sldId id="263" r:id="rId8"/>
-    <p:sldId id="264" r:id="rId9"/>
-    <p:sldId id="265" r:id="rId10"/>
-    <p:sldId id="266" r:id="rId11"/>
-    <p:sldId id="267" r:id="rId12"/>
-    <p:sldId id="268" r:id="rId13"/>
-    <p:sldId id="269" r:id="rId14"/>
+    <p:sldId id="270" r:id="rId2"/>
+    <p:sldId id="271" r:id="rId3"/>
+    <p:sldId id="257" r:id="rId4"/>
+    <p:sldId id="258" r:id="rId5"/>
+    <p:sldId id="259" r:id="rId6"/>
+    <p:sldId id="260" r:id="rId7"/>
+    <p:sldId id="261" r:id="rId8"/>
+    <p:sldId id="262" r:id="rId9"/>
+    <p:sldId id="263" r:id="rId10"/>
+    <p:sldId id="264" r:id="rId11"/>
+    <p:sldId id="265" r:id="rId12"/>
+    <p:sldId id="266" r:id="rId13"/>
+    <p:sldId id="267" r:id="rId14"/>
+    <p:sldId id="268" r:id="rId15"/>
+    <p:sldId id="269" r:id="rId16"/>
+    <p:sldId id="272" r:id="rId17"/>
   </p:sldIdLst>
   <p:sldSz cx="12192000" cy="6858000"/>
   <p:notesSz cx="6858000" cy="9144000"/>
@@ -271,7 +274,7 @@
           <a:p>
             <a:fld id="{0995D9CC-E7D8-4F07-B640-004683A0933A}" type="datetimeFigureOut">
               <a:rPr lang="fr-FR" smtClean="0"/>
-              <a:t>20/04/2020</a:t>
+              <a:t>21/04/2020</a:t>
             </a:fld>
             <a:endParaRPr lang="fr-FR"/>
           </a:p>
@@ -469,7 +472,7 @@
           <a:p>
             <a:fld id="{0995D9CC-E7D8-4F07-B640-004683A0933A}" type="datetimeFigureOut">
               <a:rPr lang="fr-FR" smtClean="0"/>
-              <a:t>20/04/2020</a:t>
+              <a:t>21/04/2020</a:t>
             </a:fld>
             <a:endParaRPr lang="fr-FR"/>
           </a:p>
@@ -677,7 +680,7 @@
           <a:p>
             <a:fld id="{0995D9CC-E7D8-4F07-B640-004683A0933A}" type="datetimeFigureOut">
               <a:rPr lang="fr-FR" smtClean="0"/>
-              <a:t>20/04/2020</a:t>
+              <a:t>21/04/2020</a:t>
             </a:fld>
             <a:endParaRPr lang="fr-FR"/>
           </a:p>
@@ -875,7 +878,7 @@
           <a:p>
             <a:fld id="{0995D9CC-E7D8-4F07-B640-004683A0933A}" type="datetimeFigureOut">
               <a:rPr lang="fr-FR" smtClean="0"/>
-              <a:t>20/04/2020</a:t>
+              <a:t>21/04/2020</a:t>
             </a:fld>
             <a:endParaRPr lang="fr-FR"/>
           </a:p>
@@ -1150,7 +1153,7 @@
           <a:p>
             <a:fld id="{0995D9CC-E7D8-4F07-B640-004683A0933A}" type="datetimeFigureOut">
               <a:rPr lang="fr-FR" smtClean="0"/>
-              <a:t>20/04/2020</a:t>
+              <a:t>21/04/2020</a:t>
             </a:fld>
             <a:endParaRPr lang="fr-FR"/>
           </a:p>
@@ -1415,7 +1418,7 @@
           <a:p>
             <a:fld id="{0995D9CC-E7D8-4F07-B640-004683A0933A}" type="datetimeFigureOut">
               <a:rPr lang="fr-FR" smtClean="0"/>
-              <a:t>20/04/2020</a:t>
+              <a:t>21/04/2020</a:t>
             </a:fld>
             <a:endParaRPr lang="fr-FR"/>
           </a:p>
@@ -1827,7 +1830,7 @@
           <a:p>
             <a:fld id="{0995D9CC-E7D8-4F07-B640-004683A0933A}" type="datetimeFigureOut">
               <a:rPr lang="fr-FR" smtClean="0"/>
-              <a:t>20/04/2020</a:t>
+              <a:t>21/04/2020</a:t>
             </a:fld>
             <a:endParaRPr lang="fr-FR"/>
           </a:p>
@@ -1968,7 +1971,7 @@
           <a:p>
             <a:fld id="{0995D9CC-E7D8-4F07-B640-004683A0933A}" type="datetimeFigureOut">
               <a:rPr lang="fr-FR" smtClean="0"/>
-              <a:t>20/04/2020</a:t>
+              <a:t>21/04/2020</a:t>
             </a:fld>
             <a:endParaRPr lang="fr-FR"/>
           </a:p>
@@ -2081,7 +2084,7 @@
           <a:p>
             <a:fld id="{0995D9CC-E7D8-4F07-B640-004683A0933A}" type="datetimeFigureOut">
               <a:rPr lang="fr-FR" smtClean="0"/>
-              <a:t>20/04/2020</a:t>
+              <a:t>21/04/2020</a:t>
             </a:fld>
             <a:endParaRPr lang="fr-FR"/>
           </a:p>
@@ -2392,7 +2395,7 @@
           <a:p>
             <a:fld id="{0995D9CC-E7D8-4F07-B640-004683A0933A}" type="datetimeFigureOut">
               <a:rPr lang="fr-FR" smtClean="0"/>
-              <a:t>20/04/2020</a:t>
+              <a:t>21/04/2020</a:t>
             </a:fld>
             <a:endParaRPr lang="fr-FR"/>
           </a:p>
@@ -2680,7 +2683,7 @@
           <a:p>
             <a:fld id="{0995D9CC-E7D8-4F07-B640-004683A0933A}" type="datetimeFigureOut">
               <a:rPr lang="fr-FR" smtClean="0"/>
-              <a:t>20/04/2020</a:t>
+              <a:t>21/04/2020</a:t>
             </a:fld>
             <a:endParaRPr lang="fr-FR"/>
           </a:p>
@@ -2921,7 +2924,7 @@
           <a:p>
             <a:fld id="{0995D9CC-E7D8-4F07-B640-004683A0933A}" type="datetimeFigureOut">
               <a:rPr lang="fr-FR" smtClean="0"/>
-              <a:t>20/04/2020</a:t>
+              <a:t>21/04/2020</a:t>
             </a:fld>
             <a:endParaRPr lang="fr-FR"/>
           </a:p>
@@ -3340,6 +3343,1274 @@
       </p:grpSpPr>
       <p:sp>
         <p:nvSpPr>
+          <p:cNvPr id="2" name="Titre 1">
+            <a:extLst>
+              <a:ext uri="{FF2B5EF4-FFF2-40B4-BE49-F238E27FC236}">
+                <a16:creationId xmlns:a16="http://schemas.microsoft.com/office/drawing/2014/main" id="{AB3F51BB-8722-4592-BB02-0022F3992D39}"/>
+              </a:ext>
+            </a:extLst>
+          </p:cNvPr>
+          <p:cNvSpPr>
+            <a:spLocks noGrp="1"/>
+          </p:cNvSpPr>
+          <p:nvPr>
+            <p:ph type="title"/>
+          </p:nvPr>
+        </p:nvSpPr>
+        <p:spPr>
+          <a:xfrm>
+            <a:off x="0" y="0"/>
+            <a:ext cx="12192000" cy="1618420"/>
+          </a:xfrm>
+        </p:spPr>
+        <p:txBody>
+          <a:bodyPr/>
+          <a:lstStyle/>
+          <a:p>
+            <a:pPr marL="742950" indent="-742950">
+              <a:buFont typeface="+mj-lt"/>
+              <a:buAutoNum type="arabicPeriod"/>
+            </a:pPr>
+            <a:r>
+              <a:rPr lang="fr-FR" dirty="0"/>
+              <a:t>Collecte d'informations</a:t>
+            </a:r>
+          </a:p>
+        </p:txBody>
+      </p:sp>
+      <p:sp>
+        <p:nvSpPr>
+          <p:cNvPr id="3" name="ZoneTexte 2">
+            <a:extLst>
+              <a:ext uri="{FF2B5EF4-FFF2-40B4-BE49-F238E27FC236}">
+                <a16:creationId xmlns:a16="http://schemas.microsoft.com/office/drawing/2014/main" id="{44BAD53A-7ED8-4E77-905E-77DEC9D0E1EE}"/>
+              </a:ext>
+            </a:extLst>
+          </p:cNvPr>
+          <p:cNvSpPr txBox="1"/>
+          <p:nvPr/>
+        </p:nvSpPr>
+        <p:spPr>
+          <a:xfrm>
+            <a:off x="0" y="1618420"/>
+            <a:ext cx="3938954" cy="1754326"/>
+          </a:xfrm>
+          <a:prstGeom prst="rect">
+            <a:avLst/>
+          </a:prstGeom>
+          <a:noFill/>
+        </p:spPr>
+        <p:txBody>
+          <a:bodyPr wrap="square" rtlCol="0">
+            <a:spAutoFit/>
+          </a:bodyPr>
+          <a:lstStyle/>
+          <a:p>
+            <a:r>
+              <a:rPr lang="fr-FR" dirty="0"/>
+              <a:t>Objectif :</a:t>
+            </a:r>
+          </a:p>
+          <a:p>
+            <a:endParaRPr lang="fr-FR" dirty="0"/>
+          </a:p>
+          <a:p>
+            <a:r>
+              <a:rPr lang="fr-FR" dirty="0"/>
+              <a:t>Principaux objectifs : </a:t>
+            </a:r>
+          </a:p>
+          <a:p>
+            <a:endParaRPr lang="fr-FR" dirty="0"/>
+          </a:p>
+          <a:p>
+            <a:r>
+              <a:rPr lang="fr-FR" dirty="0"/>
+              <a:t>Public cible :</a:t>
+            </a:r>
+          </a:p>
+          <a:p>
+            <a:endParaRPr lang="fr-FR" dirty="0"/>
+          </a:p>
+        </p:txBody>
+      </p:sp>
+    </p:spTree>
+    <p:extLst>
+      <p:ext uri="{BB962C8B-B14F-4D97-AF65-F5344CB8AC3E}">
+        <p14:creationId xmlns:p14="http://schemas.microsoft.com/office/powerpoint/2010/main" val="1075049693"/>
+      </p:ext>
+    </p:extLst>
+  </p:cSld>
+  <p:clrMapOvr>
+    <a:masterClrMapping/>
+  </p:clrMapOvr>
+</p:sld>
+</file>
+
+<file path=ppt/slides/slide10.xml><?xml version="1.0" encoding="utf-8"?>
+<p:sld xmlns:a="http://schemas.openxmlformats.org/drawingml/2006/main" xmlns:r="http://schemas.openxmlformats.org/officeDocument/2006/relationships" xmlns:p="http://schemas.openxmlformats.org/presentationml/2006/main">
+  <p:cSld>
+    <p:bg>
+      <p:bgPr>
+        <a:solidFill>
+          <a:srgbClr val="FFC000"/>
+        </a:solidFill>
+        <a:effectLst/>
+      </p:bgPr>
+    </p:bg>
+    <p:spTree>
+      <p:nvGrpSpPr>
+        <p:cNvPr id="1" name=""/>
+        <p:cNvGrpSpPr/>
+        <p:nvPr/>
+      </p:nvGrpSpPr>
+      <p:grpSpPr>
+        <a:xfrm>
+          <a:off x="0" y="0"/>
+          <a:ext cx="0" cy="0"/>
+          <a:chOff x="0" y="0"/>
+          <a:chExt cx="0" cy="0"/>
+        </a:xfrm>
+      </p:grpSpPr>
+      <p:sp>
+        <p:nvSpPr>
+          <p:cNvPr id="2" name="Titre 1">
+            <a:extLst>
+              <a:ext uri="{FF2B5EF4-FFF2-40B4-BE49-F238E27FC236}">
+                <a16:creationId xmlns:a16="http://schemas.microsoft.com/office/drawing/2014/main" id="{173A5FD7-5E5B-4F12-BA5C-1AB6C6DA9F1E}"/>
+              </a:ext>
+            </a:extLst>
+          </p:cNvPr>
+          <p:cNvSpPr>
+            <a:spLocks noGrp="1"/>
+          </p:cNvSpPr>
+          <p:nvPr>
+            <p:ph type="title"/>
+          </p:nvPr>
+        </p:nvSpPr>
+        <p:spPr>
+          <a:xfrm>
+            <a:off x="838200" y="365125"/>
+            <a:ext cx="11189677" cy="1325563"/>
+          </a:xfrm>
+        </p:spPr>
+        <p:txBody>
+          <a:bodyPr>
+            <a:normAutofit/>
+          </a:bodyPr>
+          <a:lstStyle/>
+          <a:p>
+            <a:r>
+              <a:rPr lang="fr-FR" altLang="fr-FR" sz="3200" dirty="0">
+                <a:cs typeface="Times New Roman" panose="02020603050405020304" pitchFamily="18" charset="0"/>
+              </a:rPr>
+              <a:t>Services izyGO </a:t>
+            </a:r>
+            <a:r>
+              <a:rPr lang="fr-FR" altLang="fr-FR" sz="3200" dirty="0">
+                <a:ea typeface="Calibri" panose="020F0502020204030204" pitchFamily="34" charset="0"/>
+                <a:cs typeface="Times New Roman" panose="02020603050405020304" pitchFamily="18" charset="0"/>
+              </a:rPr>
+              <a:t>: Louer un bus</a:t>
+            </a:r>
+            <a:endParaRPr lang="fr-FR" sz="3200" dirty="0"/>
+          </a:p>
+        </p:txBody>
+      </p:sp>
+      <p:sp>
+        <p:nvSpPr>
+          <p:cNvPr id="3" name="ZoneTexte 2">
+            <a:extLst>
+              <a:ext uri="{FF2B5EF4-FFF2-40B4-BE49-F238E27FC236}">
+                <a16:creationId xmlns:a16="http://schemas.microsoft.com/office/drawing/2014/main" id="{027CB3A8-775D-4714-BF00-99753B6C6F79}"/>
+              </a:ext>
+            </a:extLst>
+          </p:cNvPr>
+          <p:cNvSpPr txBox="1"/>
+          <p:nvPr/>
+        </p:nvSpPr>
+        <p:spPr>
+          <a:xfrm>
+            <a:off x="1026941" y="1690688"/>
+            <a:ext cx="10522633" cy="2554545"/>
+          </a:xfrm>
+          <a:prstGeom prst="rect">
+            <a:avLst/>
+          </a:prstGeom>
+          <a:noFill/>
+        </p:spPr>
+        <p:txBody>
+          <a:bodyPr wrap="square" rtlCol="0">
+            <a:spAutoFit/>
+          </a:bodyPr>
+          <a:lstStyle/>
+          <a:p>
+            <a:pPr marL="285750" indent="-285750">
+              <a:buFont typeface="Arial" panose="020B0604020202020204" pitchFamily="34" charset="0"/>
+              <a:buChar char="•"/>
+            </a:pPr>
+            <a:r>
+              <a:rPr lang="fr-FR" sz="3200" dirty="0">
+                <a:latin typeface="+mj-lt"/>
+              </a:rPr>
+              <a:t>Section entrée des données pour la réservation</a:t>
+            </a:r>
+          </a:p>
+          <a:p>
+            <a:pPr marL="285750" indent="-285750">
+              <a:buFont typeface="Arial" panose="020B0604020202020204" pitchFamily="34" charset="0"/>
+              <a:buChar char="•"/>
+            </a:pPr>
+            <a:r>
+              <a:rPr lang="fr-FR" sz="3200" dirty="0">
+                <a:latin typeface="+mj-lt"/>
+              </a:rPr>
+              <a:t>Section avantage du service de réservation de son propre bus </a:t>
+            </a:r>
+          </a:p>
+          <a:p>
+            <a:pPr marL="285750" indent="-285750">
+              <a:buFont typeface="Arial" panose="020B0604020202020204" pitchFamily="34" charset="0"/>
+              <a:buChar char="•"/>
+            </a:pPr>
+            <a:r>
+              <a:rPr lang="fr-FR" sz="3200" dirty="0">
+                <a:latin typeface="+mj-lt"/>
+              </a:rPr>
+              <a:t>Section témoignage des anciens clients</a:t>
+            </a:r>
+          </a:p>
+          <a:p>
+            <a:pPr marL="285750" indent="-285750">
+              <a:buFont typeface="Arial" panose="020B0604020202020204" pitchFamily="34" charset="0"/>
+              <a:buChar char="•"/>
+            </a:pPr>
+            <a:r>
+              <a:rPr lang="fr-FR" sz="3200" dirty="0">
+                <a:latin typeface="+mj-lt"/>
+              </a:rPr>
+              <a:t>Section comment ça marche </a:t>
+            </a:r>
+          </a:p>
+          <a:p>
+            <a:pPr marL="285750" indent="-285750">
+              <a:buFont typeface="Arial" panose="020B0604020202020204" pitchFamily="34" charset="0"/>
+              <a:buChar char="•"/>
+            </a:pPr>
+            <a:r>
+              <a:rPr lang="fr-FR" sz="3200" dirty="0">
+                <a:latin typeface="+mj-lt"/>
+              </a:rPr>
+              <a:t>Le pied de page</a:t>
+            </a:r>
+          </a:p>
+        </p:txBody>
+      </p:sp>
+    </p:spTree>
+    <p:extLst>
+      <p:ext uri="{BB962C8B-B14F-4D97-AF65-F5344CB8AC3E}">
+        <p14:creationId xmlns:p14="http://schemas.microsoft.com/office/powerpoint/2010/main" val="2535262240"/>
+      </p:ext>
+    </p:extLst>
+  </p:cSld>
+  <p:clrMapOvr>
+    <a:masterClrMapping/>
+  </p:clrMapOvr>
+</p:sld>
+</file>
+
+<file path=ppt/slides/slide11.xml><?xml version="1.0" encoding="utf-8"?>
+<p:sld xmlns:a="http://schemas.openxmlformats.org/drawingml/2006/main" xmlns:r="http://schemas.openxmlformats.org/officeDocument/2006/relationships" xmlns:p="http://schemas.openxmlformats.org/presentationml/2006/main">
+  <p:cSld>
+    <p:bg>
+      <p:bgPr>
+        <a:solidFill>
+          <a:srgbClr val="00B0F0"/>
+        </a:solidFill>
+        <a:effectLst/>
+      </p:bgPr>
+    </p:bg>
+    <p:spTree>
+      <p:nvGrpSpPr>
+        <p:cNvPr id="1" name=""/>
+        <p:cNvGrpSpPr/>
+        <p:nvPr/>
+      </p:nvGrpSpPr>
+      <p:grpSpPr>
+        <a:xfrm>
+          <a:off x="0" y="0"/>
+          <a:ext cx="0" cy="0"/>
+          <a:chOff x="0" y="0"/>
+          <a:chExt cx="0" cy="0"/>
+        </a:xfrm>
+      </p:grpSpPr>
+      <p:sp>
+        <p:nvSpPr>
+          <p:cNvPr id="2" name="Titre 1">
+            <a:extLst>
+              <a:ext uri="{FF2B5EF4-FFF2-40B4-BE49-F238E27FC236}">
+                <a16:creationId xmlns:a16="http://schemas.microsoft.com/office/drawing/2014/main" id="{173A5FD7-5E5B-4F12-BA5C-1AB6C6DA9F1E}"/>
+              </a:ext>
+            </a:extLst>
+          </p:cNvPr>
+          <p:cNvSpPr>
+            <a:spLocks noGrp="1"/>
+          </p:cNvSpPr>
+          <p:nvPr>
+            <p:ph type="title"/>
+          </p:nvPr>
+        </p:nvSpPr>
+        <p:spPr>
+          <a:xfrm>
+            <a:off x="838200" y="365125"/>
+            <a:ext cx="11189677" cy="1325563"/>
+          </a:xfrm>
+        </p:spPr>
+        <p:txBody>
+          <a:bodyPr>
+            <a:normAutofit/>
+          </a:bodyPr>
+          <a:lstStyle/>
+          <a:p>
+            <a:r>
+              <a:rPr lang="fr-FR" altLang="fr-FR" sz="3200" dirty="0">
+                <a:cs typeface="Times New Roman" panose="02020603050405020304" pitchFamily="18" charset="0"/>
+              </a:rPr>
+              <a:t>L’entreprise </a:t>
+            </a:r>
+            <a:r>
+              <a:rPr lang="fr-FR" altLang="fr-FR" sz="3200" dirty="0">
+                <a:ea typeface="Calibri" panose="020F0502020204030204" pitchFamily="34" charset="0"/>
+                <a:cs typeface="Times New Roman" panose="02020603050405020304" pitchFamily="18" charset="0"/>
+              </a:rPr>
+              <a:t>: A propos</a:t>
+            </a:r>
+            <a:endParaRPr lang="fr-FR" sz="3200" dirty="0"/>
+          </a:p>
+        </p:txBody>
+      </p:sp>
+      <p:sp>
+        <p:nvSpPr>
+          <p:cNvPr id="3" name="ZoneTexte 2">
+            <a:extLst>
+              <a:ext uri="{FF2B5EF4-FFF2-40B4-BE49-F238E27FC236}">
+                <a16:creationId xmlns:a16="http://schemas.microsoft.com/office/drawing/2014/main" id="{027CB3A8-775D-4714-BF00-99753B6C6F79}"/>
+              </a:ext>
+            </a:extLst>
+          </p:cNvPr>
+          <p:cNvSpPr txBox="1"/>
+          <p:nvPr/>
+        </p:nvSpPr>
+        <p:spPr>
+          <a:xfrm>
+            <a:off x="1026941" y="1690688"/>
+            <a:ext cx="10522633" cy="2062103"/>
+          </a:xfrm>
+          <a:prstGeom prst="rect">
+            <a:avLst/>
+          </a:prstGeom>
+          <a:noFill/>
+        </p:spPr>
+        <p:txBody>
+          <a:bodyPr wrap="square" rtlCol="0">
+            <a:spAutoFit/>
+          </a:bodyPr>
+          <a:lstStyle/>
+          <a:p>
+            <a:pPr marL="285750" indent="-285750">
+              <a:buFont typeface="Arial" panose="020B0604020202020204" pitchFamily="34" charset="0"/>
+              <a:buChar char="•"/>
+            </a:pPr>
+            <a:r>
+              <a:rPr lang="fr-FR" sz="3200" dirty="0">
+                <a:latin typeface="+mj-lt"/>
+              </a:rPr>
+              <a:t>Section présentation izyGO</a:t>
+            </a:r>
+          </a:p>
+          <a:p>
+            <a:pPr marL="285750" indent="-285750">
+              <a:buFont typeface="Arial" panose="020B0604020202020204" pitchFamily="34" charset="0"/>
+              <a:buChar char="•"/>
+            </a:pPr>
+            <a:r>
+              <a:rPr lang="fr-FR" sz="3200" dirty="0">
+                <a:latin typeface="+mj-lt"/>
+              </a:rPr>
+              <a:t>Section chiffres clés</a:t>
+            </a:r>
+          </a:p>
+          <a:p>
+            <a:pPr marL="285750" indent="-285750">
+              <a:buFont typeface="Arial" panose="020B0604020202020204" pitchFamily="34" charset="0"/>
+              <a:buChar char="•"/>
+            </a:pPr>
+            <a:r>
+              <a:rPr lang="fr-FR" sz="3200" dirty="0">
+                <a:latin typeface="+mj-lt"/>
+              </a:rPr>
+              <a:t>Section fondateurs</a:t>
+            </a:r>
+          </a:p>
+          <a:p>
+            <a:pPr marL="285750" indent="-285750">
+              <a:buFont typeface="Arial" panose="020B0604020202020204" pitchFamily="34" charset="0"/>
+              <a:buChar char="•"/>
+            </a:pPr>
+            <a:r>
+              <a:rPr lang="fr-FR" sz="3200" dirty="0">
+                <a:latin typeface="+mj-lt"/>
+              </a:rPr>
+              <a:t>Le pied de page</a:t>
+            </a:r>
+          </a:p>
+        </p:txBody>
+      </p:sp>
+    </p:spTree>
+    <p:extLst>
+      <p:ext uri="{BB962C8B-B14F-4D97-AF65-F5344CB8AC3E}">
+        <p14:creationId xmlns:p14="http://schemas.microsoft.com/office/powerpoint/2010/main" val="2641649781"/>
+      </p:ext>
+    </p:extLst>
+  </p:cSld>
+  <p:clrMapOvr>
+    <a:masterClrMapping/>
+  </p:clrMapOvr>
+</p:sld>
+</file>
+
+<file path=ppt/slides/slide12.xml><?xml version="1.0" encoding="utf-8"?>
+<p:sld xmlns:a="http://schemas.openxmlformats.org/drawingml/2006/main" xmlns:r="http://schemas.openxmlformats.org/officeDocument/2006/relationships" xmlns:p="http://schemas.openxmlformats.org/presentationml/2006/main">
+  <p:cSld>
+    <p:bg>
+      <p:bgPr>
+        <a:solidFill>
+          <a:srgbClr val="00B0F0"/>
+        </a:solidFill>
+        <a:effectLst/>
+      </p:bgPr>
+    </p:bg>
+    <p:spTree>
+      <p:nvGrpSpPr>
+        <p:cNvPr id="1" name=""/>
+        <p:cNvGrpSpPr/>
+        <p:nvPr/>
+      </p:nvGrpSpPr>
+      <p:grpSpPr>
+        <a:xfrm>
+          <a:off x="0" y="0"/>
+          <a:ext cx="0" cy="0"/>
+          <a:chOff x="0" y="0"/>
+          <a:chExt cx="0" cy="0"/>
+        </a:xfrm>
+      </p:grpSpPr>
+      <p:sp>
+        <p:nvSpPr>
+          <p:cNvPr id="2" name="Titre 1">
+            <a:extLst>
+              <a:ext uri="{FF2B5EF4-FFF2-40B4-BE49-F238E27FC236}">
+                <a16:creationId xmlns:a16="http://schemas.microsoft.com/office/drawing/2014/main" id="{173A5FD7-5E5B-4F12-BA5C-1AB6C6DA9F1E}"/>
+              </a:ext>
+            </a:extLst>
+          </p:cNvPr>
+          <p:cNvSpPr>
+            <a:spLocks noGrp="1"/>
+          </p:cNvSpPr>
+          <p:nvPr>
+            <p:ph type="title"/>
+          </p:nvPr>
+        </p:nvSpPr>
+        <p:spPr>
+          <a:xfrm>
+            <a:off x="838200" y="365125"/>
+            <a:ext cx="11189677" cy="1325563"/>
+          </a:xfrm>
+        </p:spPr>
+        <p:txBody>
+          <a:bodyPr>
+            <a:normAutofit/>
+          </a:bodyPr>
+          <a:lstStyle/>
+          <a:p>
+            <a:r>
+              <a:rPr lang="fr-FR" altLang="fr-FR" sz="3200" dirty="0">
+                <a:cs typeface="Times New Roman" panose="02020603050405020304" pitchFamily="18" charset="0"/>
+              </a:rPr>
+              <a:t>L’entreprise </a:t>
+            </a:r>
+            <a:r>
+              <a:rPr lang="fr-FR" altLang="fr-FR" sz="3200" dirty="0">
+                <a:ea typeface="Calibri" panose="020F0502020204030204" pitchFamily="34" charset="0"/>
+                <a:cs typeface="Times New Roman" panose="02020603050405020304" pitchFamily="18" charset="0"/>
+              </a:rPr>
+              <a:t>: Satisfaction client</a:t>
+            </a:r>
+            <a:endParaRPr lang="fr-FR" sz="3200" dirty="0"/>
+          </a:p>
+        </p:txBody>
+      </p:sp>
+      <p:sp>
+        <p:nvSpPr>
+          <p:cNvPr id="3" name="ZoneTexte 2">
+            <a:extLst>
+              <a:ext uri="{FF2B5EF4-FFF2-40B4-BE49-F238E27FC236}">
+                <a16:creationId xmlns:a16="http://schemas.microsoft.com/office/drawing/2014/main" id="{027CB3A8-775D-4714-BF00-99753B6C6F79}"/>
+              </a:ext>
+            </a:extLst>
+          </p:cNvPr>
+          <p:cNvSpPr txBox="1"/>
+          <p:nvPr/>
+        </p:nvSpPr>
+        <p:spPr>
+          <a:xfrm>
+            <a:off x="1026941" y="1690688"/>
+            <a:ext cx="10522633" cy="2062103"/>
+          </a:xfrm>
+          <a:prstGeom prst="rect">
+            <a:avLst/>
+          </a:prstGeom>
+          <a:noFill/>
+        </p:spPr>
+        <p:txBody>
+          <a:bodyPr wrap="square" rtlCol="0">
+            <a:spAutoFit/>
+          </a:bodyPr>
+          <a:lstStyle/>
+          <a:p>
+            <a:pPr marL="285750" indent="-285750">
+              <a:buFont typeface="Arial" panose="020B0604020202020204" pitchFamily="34" charset="0"/>
+              <a:buChar char="•"/>
+            </a:pPr>
+            <a:r>
+              <a:rPr lang="fr-FR" sz="3200" dirty="0">
+                <a:latin typeface="+mj-lt"/>
+              </a:rPr>
+              <a:t>Section témoignages voyageur</a:t>
+            </a:r>
+          </a:p>
+          <a:p>
+            <a:pPr marL="285750" indent="-285750">
+              <a:buFont typeface="Arial" panose="020B0604020202020204" pitchFamily="34" charset="0"/>
+              <a:buChar char="•"/>
+            </a:pPr>
+            <a:r>
+              <a:rPr lang="fr-FR" sz="3200" dirty="0">
+                <a:latin typeface="+mj-lt"/>
+              </a:rPr>
+              <a:t>Section témoignages compagnies</a:t>
+            </a:r>
+          </a:p>
+          <a:p>
+            <a:pPr marL="285750" indent="-285750">
+              <a:buFont typeface="Arial" panose="020B0604020202020204" pitchFamily="34" charset="0"/>
+              <a:buChar char="•"/>
+            </a:pPr>
+            <a:r>
+              <a:rPr lang="fr-FR" sz="3200" dirty="0">
+                <a:latin typeface="+mj-lt"/>
+              </a:rPr>
+              <a:t>Section charte et engagement pour la satisfaction client</a:t>
+            </a:r>
+          </a:p>
+          <a:p>
+            <a:pPr marL="285750" indent="-285750">
+              <a:buFont typeface="Arial" panose="020B0604020202020204" pitchFamily="34" charset="0"/>
+              <a:buChar char="•"/>
+            </a:pPr>
+            <a:r>
+              <a:rPr lang="fr-FR" sz="3200" dirty="0">
+                <a:latin typeface="+mj-lt"/>
+              </a:rPr>
+              <a:t>Le pied de page</a:t>
+            </a:r>
+          </a:p>
+        </p:txBody>
+      </p:sp>
+    </p:spTree>
+    <p:extLst>
+      <p:ext uri="{BB962C8B-B14F-4D97-AF65-F5344CB8AC3E}">
+        <p14:creationId xmlns:p14="http://schemas.microsoft.com/office/powerpoint/2010/main" val="3288368779"/>
+      </p:ext>
+    </p:extLst>
+  </p:cSld>
+  <p:clrMapOvr>
+    <a:masterClrMapping/>
+  </p:clrMapOvr>
+</p:sld>
+</file>
+
+<file path=ppt/slides/slide13.xml><?xml version="1.0" encoding="utf-8"?>
+<p:sld xmlns:a="http://schemas.openxmlformats.org/drawingml/2006/main" xmlns:r="http://schemas.openxmlformats.org/officeDocument/2006/relationships" xmlns:p="http://schemas.openxmlformats.org/presentationml/2006/main">
+  <p:cSld>
+    <p:bg>
+      <p:bgPr>
+        <a:solidFill>
+          <a:srgbClr val="00B0F0"/>
+        </a:solidFill>
+        <a:effectLst/>
+      </p:bgPr>
+    </p:bg>
+    <p:spTree>
+      <p:nvGrpSpPr>
+        <p:cNvPr id="1" name=""/>
+        <p:cNvGrpSpPr/>
+        <p:nvPr/>
+      </p:nvGrpSpPr>
+      <p:grpSpPr>
+        <a:xfrm>
+          <a:off x="0" y="0"/>
+          <a:ext cx="0" cy="0"/>
+          <a:chOff x="0" y="0"/>
+          <a:chExt cx="0" cy="0"/>
+        </a:xfrm>
+      </p:grpSpPr>
+      <p:sp>
+        <p:nvSpPr>
+          <p:cNvPr id="2" name="Titre 1">
+            <a:extLst>
+              <a:ext uri="{FF2B5EF4-FFF2-40B4-BE49-F238E27FC236}">
+                <a16:creationId xmlns:a16="http://schemas.microsoft.com/office/drawing/2014/main" id="{173A5FD7-5E5B-4F12-BA5C-1AB6C6DA9F1E}"/>
+              </a:ext>
+            </a:extLst>
+          </p:cNvPr>
+          <p:cNvSpPr>
+            <a:spLocks noGrp="1"/>
+          </p:cNvSpPr>
+          <p:nvPr>
+            <p:ph type="title"/>
+          </p:nvPr>
+        </p:nvSpPr>
+        <p:spPr>
+          <a:xfrm>
+            <a:off x="838200" y="365125"/>
+            <a:ext cx="11189677" cy="1325563"/>
+          </a:xfrm>
+        </p:spPr>
+        <p:txBody>
+          <a:bodyPr>
+            <a:normAutofit/>
+          </a:bodyPr>
+          <a:lstStyle/>
+          <a:p>
+            <a:r>
+              <a:rPr lang="fr-FR" altLang="fr-FR" sz="3200" dirty="0">
+                <a:cs typeface="Times New Roman" panose="02020603050405020304" pitchFamily="18" charset="0"/>
+              </a:rPr>
+              <a:t>L’entreprise </a:t>
+            </a:r>
+            <a:r>
+              <a:rPr lang="fr-FR" altLang="fr-FR" sz="3200" dirty="0">
+                <a:ea typeface="Calibri" panose="020F0502020204030204" pitchFamily="34" charset="0"/>
+                <a:cs typeface="Times New Roman" panose="02020603050405020304" pitchFamily="18" charset="0"/>
+              </a:rPr>
+              <a:t>: Presse</a:t>
+            </a:r>
+            <a:endParaRPr lang="fr-FR" sz="3200" dirty="0"/>
+          </a:p>
+        </p:txBody>
+      </p:sp>
+      <p:sp>
+        <p:nvSpPr>
+          <p:cNvPr id="3" name="ZoneTexte 2">
+            <a:extLst>
+              <a:ext uri="{FF2B5EF4-FFF2-40B4-BE49-F238E27FC236}">
+                <a16:creationId xmlns:a16="http://schemas.microsoft.com/office/drawing/2014/main" id="{027CB3A8-775D-4714-BF00-99753B6C6F79}"/>
+              </a:ext>
+            </a:extLst>
+          </p:cNvPr>
+          <p:cNvSpPr txBox="1"/>
+          <p:nvPr/>
+        </p:nvSpPr>
+        <p:spPr>
+          <a:xfrm>
+            <a:off x="1026941" y="1690688"/>
+            <a:ext cx="10522633" cy="2062103"/>
+          </a:xfrm>
+          <a:prstGeom prst="rect">
+            <a:avLst/>
+          </a:prstGeom>
+          <a:noFill/>
+        </p:spPr>
+        <p:txBody>
+          <a:bodyPr wrap="square" rtlCol="0">
+            <a:spAutoFit/>
+          </a:bodyPr>
+          <a:lstStyle/>
+          <a:p>
+            <a:pPr marL="285750" indent="-285750">
+              <a:buFont typeface="Arial" panose="020B0604020202020204" pitchFamily="34" charset="0"/>
+              <a:buChar char="•"/>
+            </a:pPr>
+            <a:r>
+              <a:rPr lang="fr-FR" sz="3200" dirty="0">
+                <a:latin typeface="+mj-lt"/>
+              </a:rPr>
+              <a:t>Section présentation lien contact presse avec l’entreprise</a:t>
+            </a:r>
+          </a:p>
+          <a:p>
+            <a:pPr marL="285750" indent="-285750">
+              <a:buFont typeface="Arial" panose="020B0604020202020204" pitchFamily="34" charset="0"/>
+              <a:buChar char="•"/>
+            </a:pPr>
+            <a:r>
+              <a:rPr lang="fr-FR" sz="3200" dirty="0">
+                <a:latin typeface="+mj-lt"/>
+              </a:rPr>
+              <a:t>Article à la une</a:t>
+            </a:r>
+          </a:p>
+          <a:p>
+            <a:pPr marL="285750" indent="-285750">
+              <a:buFont typeface="Arial" panose="020B0604020202020204" pitchFamily="34" charset="0"/>
+              <a:buChar char="•"/>
+            </a:pPr>
+            <a:r>
+              <a:rPr lang="fr-FR" sz="3200" dirty="0">
+                <a:latin typeface="+mj-lt"/>
+              </a:rPr>
+              <a:t>Médiathèque</a:t>
+            </a:r>
+          </a:p>
+          <a:p>
+            <a:pPr marL="285750" indent="-285750">
+              <a:buFont typeface="Arial" panose="020B0604020202020204" pitchFamily="34" charset="0"/>
+              <a:buChar char="•"/>
+            </a:pPr>
+            <a:r>
+              <a:rPr lang="fr-FR" sz="3200" dirty="0">
+                <a:latin typeface="+mj-lt"/>
+              </a:rPr>
+              <a:t>Le pied de page</a:t>
+            </a:r>
+          </a:p>
+        </p:txBody>
+      </p:sp>
+    </p:spTree>
+    <p:extLst>
+      <p:ext uri="{BB962C8B-B14F-4D97-AF65-F5344CB8AC3E}">
+        <p14:creationId xmlns:p14="http://schemas.microsoft.com/office/powerpoint/2010/main" val="3772829318"/>
+      </p:ext>
+    </p:extLst>
+  </p:cSld>
+  <p:clrMapOvr>
+    <a:masterClrMapping/>
+  </p:clrMapOvr>
+</p:sld>
+</file>
+
+<file path=ppt/slides/slide14.xml><?xml version="1.0" encoding="utf-8"?>
+<p:sld xmlns:a="http://schemas.openxmlformats.org/drawingml/2006/main" xmlns:r="http://schemas.openxmlformats.org/officeDocument/2006/relationships" xmlns:p="http://schemas.openxmlformats.org/presentationml/2006/main">
+  <p:cSld>
+    <p:bg>
+      <p:bgPr>
+        <a:solidFill>
+          <a:schemeClr val="accent2">
+            <a:lumMod val="40000"/>
+            <a:lumOff val="60000"/>
+          </a:schemeClr>
+        </a:solidFill>
+        <a:effectLst/>
+      </p:bgPr>
+    </p:bg>
+    <p:spTree>
+      <p:nvGrpSpPr>
+        <p:cNvPr id="1" name=""/>
+        <p:cNvGrpSpPr/>
+        <p:nvPr/>
+      </p:nvGrpSpPr>
+      <p:grpSpPr>
+        <a:xfrm>
+          <a:off x="0" y="0"/>
+          <a:ext cx="0" cy="0"/>
+          <a:chOff x="0" y="0"/>
+          <a:chExt cx="0" cy="0"/>
+        </a:xfrm>
+      </p:grpSpPr>
+      <p:sp>
+        <p:nvSpPr>
+          <p:cNvPr id="2" name="Titre 1">
+            <a:extLst>
+              <a:ext uri="{FF2B5EF4-FFF2-40B4-BE49-F238E27FC236}">
+                <a16:creationId xmlns:a16="http://schemas.microsoft.com/office/drawing/2014/main" id="{173A5FD7-5E5B-4F12-BA5C-1AB6C6DA9F1E}"/>
+              </a:ext>
+            </a:extLst>
+          </p:cNvPr>
+          <p:cNvSpPr>
+            <a:spLocks noGrp="1"/>
+          </p:cNvSpPr>
+          <p:nvPr>
+            <p:ph type="title"/>
+          </p:nvPr>
+        </p:nvSpPr>
+        <p:spPr>
+          <a:xfrm>
+            <a:off x="838200" y="365125"/>
+            <a:ext cx="11189677" cy="1325563"/>
+          </a:xfrm>
+        </p:spPr>
+        <p:txBody>
+          <a:bodyPr>
+            <a:normAutofit/>
+          </a:bodyPr>
+          <a:lstStyle/>
+          <a:p>
+            <a:r>
+              <a:rPr lang="fr-FR" altLang="fr-FR" sz="3200" dirty="0">
+                <a:cs typeface="Times New Roman" panose="02020603050405020304" pitchFamily="18" charset="0"/>
+              </a:rPr>
+              <a:t>Aide &amp; FAQ</a:t>
+            </a:r>
+            <a:endParaRPr lang="fr-FR" sz="3200" dirty="0"/>
+          </a:p>
+        </p:txBody>
+      </p:sp>
+      <p:sp>
+        <p:nvSpPr>
+          <p:cNvPr id="3" name="ZoneTexte 2">
+            <a:extLst>
+              <a:ext uri="{FF2B5EF4-FFF2-40B4-BE49-F238E27FC236}">
+                <a16:creationId xmlns:a16="http://schemas.microsoft.com/office/drawing/2014/main" id="{027CB3A8-775D-4714-BF00-99753B6C6F79}"/>
+              </a:ext>
+            </a:extLst>
+          </p:cNvPr>
+          <p:cNvSpPr txBox="1"/>
+          <p:nvPr/>
+        </p:nvSpPr>
+        <p:spPr>
+          <a:xfrm>
+            <a:off x="1026941" y="1690688"/>
+            <a:ext cx="10522633" cy="2554545"/>
+          </a:xfrm>
+          <a:prstGeom prst="rect">
+            <a:avLst/>
+          </a:prstGeom>
+          <a:noFill/>
+        </p:spPr>
+        <p:txBody>
+          <a:bodyPr wrap="square" rtlCol="0">
+            <a:spAutoFit/>
+          </a:bodyPr>
+          <a:lstStyle/>
+          <a:p>
+            <a:pPr marL="285750" indent="-285750">
+              <a:buFont typeface="Arial" panose="020B0604020202020204" pitchFamily="34" charset="0"/>
+              <a:buChar char="•"/>
+            </a:pPr>
+            <a:r>
+              <a:rPr lang="fr-FR" sz="3200" dirty="0">
+                <a:latin typeface="+mj-lt"/>
+              </a:rPr>
+              <a:t>Section aide concernant réservations</a:t>
+            </a:r>
+          </a:p>
+          <a:p>
+            <a:pPr marL="285750" indent="-285750">
+              <a:buFont typeface="Arial" panose="020B0604020202020204" pitchFamily="34" charset="0"/>
+              <a:buChar char="•"/>
+            </a:pPr>
+            <a:r>
+              <a:rPr lang="fr-FR" sz="3200" dirty="0">
+                <a:latin typeface="+mj-lt"/>
+              </a:rPr>
+              <a:t>Section aide concernant les payements</a:t>
+            </a:r>
+          </a:p>
+          <a:p>
+            <a:pPr marL="285750" indent="-285750">
+              <a:buFont typeface="Arial" panose="020B0604020202020204" pitchFamily="34" charset="0"/>
+              <a:buChar char="•"/>
+            </a:pPr>
+            <a:r>
+              <a:rPr lang="fr-FR" sz="3200" dirty="0">
+                <a:latin typeface="+mj-lt"/>
+              </a:rPr>
+              <a:t>Section aide concernant le voyages : sièges, arrêts, imprévus</a:t>
+            </a:r>
+          </a:p>
+          <a:p>
+            <a:pPr marL="285750" indent="-285750">
+              <a:buFont typeface="Arial" panose="020B0604020202020204" pitchFamily="34" charset="0"/>
+              <a:buChar char="•"/>
+            </a:pPr>
+            <a:r>
+              <a:rPr lang="fr-FR" sz="3200" dirty="0">
+                <a:latin typeface="+mj-lt"/>
+              </a:rPr>
+              <a:t>Devenir partenaires</a:t>
+            </a:r>
+          </a:p>
+          <a:p>
+            <a:pPr marL="285750" indent="-285750">
+              <a:buFont typeface="Arial" panose="020B0604020202020204" pitchFamily="34" charset="0"/>
+              <a:buChar char="•"/>
+            </a:pPr>
+            <a:r>
+              <a:rPr lang="fr-FR" sz="3200" dirty="0">
+                <a:latin typeface="+mj-lt"/>
+              </a:rPr>
+              <a:t>Le pied de page</a:t>
+            </a:r>
+          </a:p>
+        </p:txBody>
+      </p:sp>
+    </p:spTree>
+    <p:extLst>
+      <p:ext uri="{BB962C8B-B14F-4D97-AF65-F5344CB8AC3E}">
+        <p14:creationId xmlns:p14="http://schemas.microsoft.com/office/powerpoint/2010/main" val="2086402098"/>
+      </p:ext>
+    </p:extLst>
+  </p:cSld>
+  <p:clrMapOvr>
+    <a:masterClrMapping/>
+  </p:clrMapOvr>
+</p:sld>
+</file>
+
+<file path=ppt/slides/slide15.xml><?xml version="1.0" encoding="utf-8"?>
+<p:sld xmlns:a="http://schemas.openxmlformats.org/drawingml/2006/main" xmlns:r="http://schemas.openxmlformats.org/officeDocument/2006/relationships" xmlns:p="http://schemas.openxmlformats.org/presentationml/2006/main">
+  <p:cSld>
+    <p:bg>
+      <p:bgPr>
+        <a:solidFill>
+          <a:schemeClr val="accent3"/>
+        </a:solidFill>
+        <a:effectLst/>
+      </p:bgPr>
+    </p:bg>
+    <p:spTree>
+      <p:nvGrpSpPr>
+        <p:cNvPr id="1" name=""/>
+        <p:cNvGrpSpPr/>
+        <p:nvPr/>
+      </p:nvGrpSpPr>
+      <p:grpSpPr>
+        <a:xfrm>
+          <a:off x="0" y="0"/>
+          <a:ext cx="0" cy="0"/>
+          <a:chOff x="0" y="0"/>
+          <a:chExt cx="0" cy="0"/>
+        </a:xfrm>
+      </p:grpSpPr>
+      <p:sp>
+        <p:nvSpPr>
+          <p:cNvPr id="2" name="Titre 1">
+            <a:extLst>
+              <a:ext uri="{FF2B5EF4-FFF2-40B4-BE49-F238E27FC236}">
+                <a16:creationId xmlns:a16="http://schemas.microsoft.com/office/drawing/2014/main" id="{173A5FD7-5E5B-4F12-BA5C-1AB6C6DA9F1E}"/>
+              </a:ext>
+            </a:extLst>
+          </p:cNvPr>
+          <p:cNvSpPr>
+            <a:spLocks noGrp="1"/>
+          </p:cNvSpPr>
+          <p:nvPr>
+            <p:ph type="title"/>
+          </p:nvPr>
+        </p:nvSpPr>
+        <p:spPr>
+          <a:xfrm>
+            <a:off x="838200" y="365125"/>
+            <a:ext cx="11189677" cy="1325563"/>
+          </a:xfrm>
+        </p:spPr>
+        <p:txBody>
+          <a:bodyPr>
+            <a:normAutofit/>
+          </a:bodyPr>
+          <a:lstStyle/>
+          <a:p>
+            <a:r>
+              <a:rPr lang="fr-FR" altLang="fr-FR" sz="3200">
+                <a:cs typeface="Times New Roman" panose="02020603050405020304" pitchFamily="18" charset="0"/>
+              </a:rPr>
+              <a:t>LOG-IN</a:t>
+            </a:r>
+            <a:endParaRPr lang="fr-FR" sz="3200" dirty="0"/>
+          </a:p>
+        </p:txBody>
+      </p:sp>
+      <p:sp>
+        <p:nvSpPr>
+          <p:cNvPr id="3" name="ZoneTexte 2">
+            <a:extLst>
+              <a:ext uri="{FF2B5EF4-FFF2-40B4-BE49-F238E27FC236}">
+                <a16:creationId xmlns:a16="http://schemas.microsoft.com/office/drawing/2014/main" id="{027CB3A8-775D-4714-BF00-99753B6C6F79}"/>
+              </a:ext>
+            </a:extLst>
+          </p:cNvPr>
+          <p:cNvSpPr txBox="1"/>
+          <p:nvPr/>
+        </p:nvSpPr>
+        <p:spPr>
+          <a:xfrm>
+            <a:off x="1026941" y="1690688"/>
+            <a:ext cx="10522633" cy="1569660"/>
+          </a:xfrm>
+          <a:prstGeom prst="rect">
+            <a:avLst/>
+          </a:prstGeom>
+          <a:noFill/>
+        </p:spPr>
+        <p:txBody>
+          <a:bodyPr wrap="square" rtlCol="0">
+            <a:spAutoFit/>
+          </a:bodyPr>
+          <a:lstStyle/>
+          <a:p>
+            <a:pPr marL="285750" indent="-285750">
+              <a:buFont typeface="Arial" panose="020B0604020202020204" pitchFamily="34" charset="0"/>
+              <a:buChar char="•"/>
+            </a:pPr>
+            <a:r>
+              <a:rPr lang="fr-FR" sz="3200" dirty="0">
+                <a:latin typeface="+mj-lt"/>
+              </a:rPr>
+              <a:t>Façade connexion / inscription pour clients et agences démarchages</a:t>
+            </a:r>
+          </a:p>
+          <a:p>
+            <a:pPr marL="285750" indent="-285750">
+              <a:buFont typeface="Arial" panose="020B0604020202020204" pitchFamily="34" charset="0"/>
+              <a:buChar char="•"/>
+            </a:pPr>
+            <a:r>
+              <a:rPr lang="fr-FR" sz="3200" dirty="0">
+                <a:latin typeface="+mj-lt"/>
+              </a:rPr>
+              <a:t>Le pied de page</a:t>
+            </a:r>
+          </a:p>
+        </p:txBody>
+      </p:sp>
+    </p:spTree>
+    <p:extLst>
+      <p:ext uri="{BB962C8B-B14F-4D97-AF65-F5344CB8AC3E}">
+        <p14:creationId xmlns:p14="http://schemas.microsoft.com/office/powerpoint/2010/main" val="4294409896"/>
+      </p:ext>
+    </p:extLst>
+  </p:cSld>
+  <p:clrMapOvr>
+    <a:masterClrMapping/>
+  </p:clrMapOvr>
+</p:sld>
+</file>
+
+<file path=ppt/slides/slide16.xml><?xml version="1.0" encoding="utf-8"?>
+<p:sld xmlns:a="http://schemas.openxmlformats.org/drawingml/2006/main" xmlns:r="http://schemas.openxmlformats.org/officeDocument/2006/relationships" xmlns:p="http://schemas.openxmlformats.org/presentationml/2006/main">
+  <p:cSld>
+    <p:spTree>
+      <p:nvGrpSpPr>
+        <p:cNvPr id="1" name=""/>
+        <p:cNvGrpSpPr/>
+        <p:nvPr/>
+      </p:nvGrpSpPr>
+      <p:grpSpPr>
+        <a:xfrm>
+          <a:off x="0" y="0"/>
+          <a:ext cx="0" cy="0"/>
+          <a:chOff x="0" y="0"/>
+          <a:chExt cx="0" cy="0"/>
+        </a:xfrm>
+      </p:grpSpPr>
+      <p:sp>
+        <p:nvSpPr>
+          <p:cNvPr id="2" name="Titre 1">
+            <a:extLst>
+              <a:ext uri="{FF2B5EF4-FFF2-40B4-BE49-F238E27FC236}">
+                <a16:creationId xmlns:a16="http://schemas.microsoft.com/office/drawing/2014/main" id="{AB3F51BB-8722-4592-BB02-0022F3992D39}"/>
+              </a:ext>
+            </a:extLst>
+          </p:cNvPr>
+          <p:cNvSpPr>
+            <a:spLocks noGrp="1"/>
+          </p:cNvSpPr>
+          <p:nvPr>
+            <p:ph type="title"/>
+          </p:nvPr>
+        </p:nvSpPr>
+        <p:spPr>
+          <a:xfrm>
+            <a:off x="0" y="0"/>
+            <a:ext cx="12192000" cy="1618420"/>
+          </a:xfrm>
+        </p:spPr>
+        <p:txBody>
+          <a:bodyPr/>
+          <a:lstStyle/>
+          <a:p>
+            <a:r>
+              <a:rPr lang="fr-FR" dirty="0"/>
+              <a:t>2. Planification</a:t>
+            </a:r>
+          </a:p>
+        </p:txBody>
+      </p:sp>
+      <p:sp>
+        <p:nvSpPr>
+          <p:cNvPr id="3" name="ZoneTexte 2">
+            <a:extLst>
+              <a:ext uri="{FF2B5EF4-FFF2-40B4-BE49-F238E27FC236}">
+                <a16:creationId xmlns:a16="http://schemas.microsoft.com/office/drawing/2014/main" id="{44BAD53A-7ED8-4E77-905E-77DEC9D0E1EE}"/>
+              </a:ext>
+            </a:extLst>
+          </p:cNvPr>
+          <p:cNvSpPr txBox="1"/>
+          <p:nvPr/>
+        </p:nvSpPr>
+        <p:spPr>
+          <a:xfrm>
+            <a:off x="0" y="1618420"/>
+            <a:ext cx="3938954" cy="369332"/>
+          </a:xfrm>
+          <a:prstGeom prst="rect">
+            <a:avLst/>
+          </a:prstGeom>
+          <a:noFill/>
+        </p:spPr>
+        <p:txBody>
+          <a:bodyPr wrap="square" rtlCol="0">
+            <a:spAutoFit/>
+          </a:bodyPr>
+          <a:lstStyle/>
+          <a:p>
+            <a:r>
+              <a:rPr lang="fr-FR" dirty="0"/>
+              <a:t>Wireframes </a:t>
+            </a:r>
+          </a:p>
+        </p:txBody>
+      </p:sp>
+    </p:spTree>
+    <p:extLst>
+      <p:ext uri="{BB962C8B-B14F-4D97-AF65-F5344CB8AC3E}">
+        <p14:creationId xmlns:p14="http://schemas.microsoft.com/office/powerpoint/2010/main" val="335532679"/>
+      </p:ext>
+    </p:extLst>
+  </p:cSld>
+  <p:clrMapOvr>
+    <a:masterClrMapping/>
+  </p:clrMapOvr>
+</p:sld>
+</file>
+
+<file path=ppt/slides/slide2.xml><?xml version="1.0" encoding="utf-8"?>
+<p:sld xmlns:a="http://schemas.openxmlformats.org/drawingml/2006/main" xmlns:r="http://schemas.openxmlformats.org/officeDocument/2006/relationships" xmlns:p="http://schemas.openxmlformats.org/presentationml/2006/main">
+  <p:cSld>
+    <p:spTree>
+      <p:nvGrpSpPr>
+        <p:cNvPr id="1" name=""/>
+        <p:cNvGrpSpPr/>
+        <p:nvPr/>
+      </p:nvGrpSpPr>
+      <p:grpSpPr>
+        <a:xfrm>
+          <a:off x="0" y="0"/>
+          <a:ext cx="0" cy="0"/>
+          <a:chOff x="0" y="0"/>
+          <a:chExt cx="0" cy="0"/>
+        </a:xfrm>
+      </p:grpSpPr>
+      <p:sp>
+        <p:nvSpPr>
+          <p:cNvPr id="2" name="Titre 1">
+            <a:extLst>
+              <a:ext uri="{FF2B5EF4-FFF2-40B4-BE49-F238E27FC236}">
+                <a16:creationId xmlns:a16="http://schemas.microsoft.com/office/drawing/2014/main" id="{AB3F51BB-8722-4592-BB02-0022F3992D39}"/>
+              </a:ext>
+            </a:extLst>
+          </p:cNvPr>
+          <p:cNvSpPr>
+            <a:spLocks noGrp="1"/>
+          </p:cNvSpPr>
+          <p:nvPr>
+            <p:ph type="title"/>
+          </p:nvPr>
+        </p:nvSpPr>
+        <p:spPr>
+          <a:xfrm>
+            <a:off x="0" y="0"/>
+            <a:ext cx="12192000" cy="1618420"/>
+          </a:xfrm>
+        </p:spPr>
+        <p:txBody>
+          <a:bodyPr/>
+          <a:lstStyle/>
+          <a:p>
+            <a:r>
+              <a:rPr lang="fr-FR" dirty="0"/>
+              <a:t>2. Planification</a:t>
+            </a:r>
+          </a:p>
+        </p:txBody>
+      </p:sp>
+      <p:sp>
+        <p:nvSpPr>
+          <p:cNvPr id="3" name="ZoneTexte 2">
+            <a:extLst>
+              <a:ext uri="{FF2B5EF4-FFF2-40B4-BE49-F238E27FC236}">
+                <a16:creationId xmlns:a16="http://schemas.microsoft.com/office/drawing/2014/main" id="{44BAD53A-7ED8-4E77-905E-77DEC9D0E1EE}"/>
+              </a:ext>
+            </a:extLst>
+          </p:cNvPr>
+          <p:cNvSpPr txBox="1"/>
+          <p:nvPr/>
+        </p:nvSpPr>
+        <p:spPr>
+          <a:xfrm>
+            <a:off x="0" y="1618420"/>
+            <a:ext cx="3938954" cy="369332"/>
+          </a:xfrm>
+          <a:prstGeom prst="rect">
+            <a:avLst/>
+          </a:prstGeom>
+          <a:noFill/>
+        </p:spPr>
+        <p:txBody>
+          <a:bodyPr wrap="square" rtlCol="0">
+            <a:spAutoFit/>
+          </a:bodyPr>
+          <a:lstStyle/>
+          <a:p>
+            <a:r>
+              <a:rPr lang="fr-FR" dirty="0"/>
+              <a:t>Plan du site</a:t>
+            </a:r>
+          </a:p>
+        </p:txBody>
+      </p:sp>
+    </p:spTree>
+    <p:extLst>
+      <p:ext uri="{BB962C8B-B14F-4D97-AF65-F5344CB8AC3E}">
+        <p14:creationId xmlns:p14="http://schemas.microsoft.com/office/powerpoint/2010/main" val="538723022"/>
+      </p:ext>
+    </p:extLst>
+  </p:cSld>
+  <p:clrMapOvr>
+    <a:masterClrMapping/>
+  </p:clrMapOvr>
+</p:sld>
+</file>
+
+<file path=ppt/slides/slide3.xml><?xml version="1.0" encoding="utf-8"?>
+<p:sld xmlns:a="http://schemas.openxmlformats.org/drawingml/2006/main" xmlns:r="http://schemas.openxmlformats.org/officeDocument/2006/relationships" xmlns:p="http://schemas.openxmlformats.org/presentationml/2006/main">
+  <p:cSld>
+    <p:spTree>
+      <p:nvGrpSpPr>
+        <p:cNvPr id="1" name=""/>
+        <p:cNvGrpSpPr/>
+        <p:nvPr/>
+      </p:nvGrpSpPr>
+      <p:grpSpPr>
+        <a:xfrm>
+          <a:off x="0" y="0"/>
+          <a:ext cx="0" cy="0"/>
+          <a:chOff x="0" y="0"/>
+          <a:chExt cx="0" cy="0"/>
+        </a:xfrm>
+      </p:grpSpPr>
+      <p:sp>
+        <p:nvSpPr>
           <p:cNvPr id="2" name="Rectangle 1">
             <a:extLst>
               <a:ext uri="{FF2B5EF4-FFF2-40B4-BE49-F238E27FC236}">
@@ -3760,7 +5031,7 @@
         </p:nvSpPr>
         <p:spPr bwMode="auto">
           <a:xfrm>
-            <a:off x="676501" y="2529857"/>
+            <a:off x="676501" y="2600197"/>
             <a:ext cx="981075" cy="571500"/>
           </a:xfrm>
           <a:prstGeom prst="roundRect">
@@ -3848,7 +5119,7 @@
         </p:nvSpPr>
         <p:spPr bwMode="auto">
           <a:xfrm>
-            <a:off x="670704" y="3675938"/>
+            <a:off x="670704" y="3746278"/>
             <a:ext cx="981075" cy="571500"/>
           </a:xfrm>
           <a:prstGeom prst="roundRect">
@@ -4434,7 +5705,7 @@
         </p:nvSpPr>
         <p:spPr bwMode="auto">
           <a:xfrm>
-            <a:off x="679098" y="4933414"/>
+            <a:off x="679098" y="5003754"/>
             <a:ext cx="981075" cy="571500"/>
           </a:xfrm>
           <a:prstGeom prst="roundRect">
@@ -4942,7 +6213,7 @@
         </p:nvCxnSpPr>
         <p:spPr>
           <a:xfrm flipH="1">
-            <a:off x="2246449" y="2242828"/>
+            <a:off x="2246449" y="2313168"/>
             <a:ext cx="2037" cy="2994748"/>
           </a:xfrm>
           <a:prstGeom prst="line">
@@ -4980,7 +6251,7 @@
         </p:nvCxnSpPr>
         <p:spPr>
           <a:xfrm flipV="1">
-            <a:off x="1077618" y="2236763"/>
+            <a:off x="1077618" y="2307103"/>
             <a:ext cx="1170868" cy="9040"/>
           </a:xfrm>
           <a:prstGeom prst="line">
@@ -5018,7 +6289,7 @@
         </p:nvCxnSpPr>
         <p:spPr>
           <a:xfrm>
-            <a:off x="1653816" y="2848363"/>
+            <a:off x="1653816" y="2918703"/>
             <a:ext cx="594670" cy="0"/>
           </a:xfrm>
           <a:prstGeom prst="line">
@@ -5056,7 +6327,7 @@
         </p:nvCxnSpPr>
         <p:spPr>
           <a:xfrm>
-            <a:off x="1651779" y="3986414"/>
+            <a:off x="1651779" y="4056754"/>
             <a:ext cx="594670" cy="0"/>
           </a:xfrm>
           <a:prstGeom prst="line">
@@ -5094,7 +6365,7 @@
         </p:nvCxnSpPr>
         <p:spPr>
           <a:xfrm>
-            <a:off x="1651779" y="5237576"/>
+            <a:off x="1651779" y="5307916"/>
             <a:ext cx="594670" cy="0"/>
           </a:xfrm>
           <a:prstGeom prst="line">
@@ -5570,23 +6841,22 @@
       </p:cxnSp>
       <p:cxnSp>
         <p:nvCxnSpPr>
-          <p:cNvPr id="46" name="Connecteur droit 45">
-            <a:extLst>
-              <a:ext uri="{FF2B5EF4-FFF2-40B4-BE49-F238E27FC236}">
-                <a16:creationId xmlns:a16="http://schemas.microsoft.com/office/drawing/2014/main" id="{12D08BDE-1217-4B85-80AF-9396EECA0FA6}"/>
+          <p:cNvPr id="59" name="Connecteur droit 58">
+            <a:extLst>
+              <a:ext uri="{FF2B5EF4-FFF2-40B4-BE49-F238E27FC236}">
+                <a16:creationId xmlns:a16="http://schemas.microsoft.com/office/drawing/2014/main" id="{EBACF61F-80B7-4F10-BE4F-AD9410EA7A40}"/>
               </a:ext>
             </a:extLst>
           </p:cNvPr>
           <p:cNvCxnSpPr>
             <a:cxnSpLocks/>
-            <a:stCxn id="3" idx="2"/>
           </p:cNvCxnSpPr>
           <p:nvPr/>
         </p:nvCxnSpPr>
         <p:spPr>
-          <a:xfrm>
-            <a:off x="1055260" y="2080526"/>
-            <a:ext cx="30312" cy="153023"/>
+          <a:xfrm flipH="1">
+            <a:off x="1086714" y="2107314"/>
+            <a:ext cx="1" cy="214983"/>
           </a:xfrm>
           <a:prstGeom prst="line">
             <a:avLst/>
@@ -5620,624 +6890,7 @@
 </p:sld>
 </file>
 
-<file path=ppt/slides/slide10.xml><?xml version="1.0" encoding="utf-8"?>
-<p:sld xmlns:a="http://schemas.openxmlformats.org/drawingml/2006/main" xmlns:r="http://schemas.openxmlformats.org/officeDocument/2006/relationships" xmlns:p="http://schemas.openxmlformats.org/presentationml/2006/main">
-  <p:cSld>
-    <p:bg>
-      <p:bgPr>
-        <a:solidFill>
-          <a:srgbClr val="00B0F0"/>
-        </a:solidFill>
-        <a:effectLst/>
-      </p:bgPr>
-    </p:bg>
-    <p:spTree>
-      <p:nvGrpSpPr>
-        <p:cNvPr id="1" name=""/>
-        <p:cNvGrpSpPr/>
-        <p:nvPr/>
-      </p:nvGrpSpPr>
-      <p:grpSpPr>
-        <a:xfrm>
-          <a:off x="0" y="0"/>
-          <a:ext cx="0" cy="0"/>
-          <a:chOff x="0" y="0"/>
-          <a:chExt cx="0" cy="0"/>
-        </a:xfrm>
-      </p:grpSpPr>
-      <p:sp>
-        <p:nvSpPr>
-          <p:cNvPr id="2" name="Titre 1">
-            <a:extLst>
-              <a:ext uri="{FF2B5EF4-FFF2-40B4-BE49-F238E27FC236}">
-                <a16:creationId xmlns:a16="http://schemas.microsoft.com/office/drawing/2014/main" id="{173A5FD7-5E5B-4F12-BA5C-1AB6C6DA9F1E}"/>
-              </a:ext>
-            </a:extLst>
-          </p:cNvPr>
-          <p:cNvSpPr>
-            <a:spLocks noGrp="1"/>
-          </p:cNvSpPr>
-          <p:nvPr>
-            <p:ph type="title"/>
-          </p:nvPr>
-        </p:nvSpPr>
-        <p:spPr>
-          <a:xfrm>
-            <a:off x="838200" y="365125"/>
-            <a:ext cx="11189677" cy="1325563"/>
-          </a:xfrm>
-        </p:spPr>
-        <p:txBody>
-          <a:bodyPr>
-            <a:normAutofit/>
-          </a:bodyPr>
-          <a:lstStyle/>
-          <a:p>
-            <a:r>
-              <a:rPr lang="fr-FR" altLang="fr-FR" sz="3200" dirty="0">
-                <a:cs typeface="Times New Roman" panose="02020603050405020304" pitchFamily="18" charset="0"/>
-              </a:rPr>
-              <a:t>L’entreprise </a:t>
-            </a:r>
-            <a:r>
-              <a:rPr lang="fr-FR" altLang="fr-FR" sz="3200" dirty="0">
-                <a:ea typeface="Calibri" panose="020F0502020204030204" pitchFamily="34" charset="0"/>
-                <a:cs typeface="Times New Roman" panose="02020603050405020304" pitchFamily="18" charset="0"/>
-              </a:rPr>
-              <a:t>: Satisfaction client</a:t>
-            </a:r>
-            <a:endParaRPr lang="fr-FR" sz="3200" dirty="0"/>
-          </a:p>
-        </p:txBody>
-      </p:sp>
-      <p:sp>
-        <p:nvSpPr>
-          <p:cNvPr id="3" name="ZoneTexte 2">
-            <a:extLst>
-              <a:ext uri="{FF2B5EF4-FFF2-40B4-BE49-F238E27FC236}">
-                <a16:creationId xmlns:a16="http://schemas.microsoft.com/office/drawing/2014/main" id="{027CB3A8-775D-4714-BF00-99753B6C6F79}"/>
-              </a:ext>
-            </a:extLst>
-          </p:cNvPr>
-          <p:cNvSpPr txBox="1"/>
-          <p:nvPr/>
-        </p:nvSpPr>
-        <p:spPr>
-          <a:xfrm>
-            <a:off x="1026941" y="1690688"/>
-            <a:ext cx="10522633" cy="2062103"/>
-          </a:xfrm>
-          <a:prstGeom prst="rect">
-            <a:avLst/>
-          </a:prstGeom>
-          <a:noFill/>
-        </p:spPr>
-        <p:txBody>
-          <a:bodyPr wrap="square" rtlCol="0">
-            <a:spAutoFit/>
-          </a:bodyPr>
-          <a:lstStyle/>
-          <a:p>
-            <a:pPr marL="285750" indent="-285750">
-              <a:buFont typeface="Arial" panose="020B0604020202020204" pitchFamily="34" charset="0"/>
-              <a:buChar char="•"/>
-            </a:pPr>
-            <a:r>
-              <a:rPr lang="fr-FR" sz="3200" dirty="0">
-                <a:latin typeface="+mj-lt"/>
-              </a:rPr>
-              <a:t>Section témoignages voyageur</a:t>
-            </a:r>
-          </a:p>
-          <a:p>
-            <a:pPr marL="285750" indent="-285750">
-              <a:buFont typeface="Arial" panose="020B0604020202020204" pitchFamily="34" charset="0"/>
-              <a:buChar char="•"/>
-            </a:pPr>
-            <a:r>
-              <a:rPr lang="fr-FR" sz="3200" dirty="0">
-                <a:latin typeface="+mj-lt"/>
-              </a:rPr>
-              <a:t>Section témoignages compagnies</a:t>
-            </a:r>
-          </a:p>
-          <a:p>
-            <a:pPr marL="285750" indent="-285750">
-              <a:buFont typeface="Arial" panose="020B0604020202020204" pitchFamily="34" charset="0"/>
-              <a:buChar char="•"/>
-            </a:pPr>
-            <a:r>
-              <a:rPr lang="fr-FR" sz="3200" dirty="0">
-                <a:latin typeface="+mj-lt"/>
-              </a:rPr>
-              <a:t>Section charte et engagement pour la satisfaction client</a:t>
-            </a:r>
-          </a:p>
-          <a:p>
-            <a:pPr marL="285750" indent="-285750">
-              <a:buFont typeface="Arial" panose="020B0604020202020204" pitchFamily="34" charset="0"/>
-              <a:buChar char="•"/>
-            </a:pPr>
-            <a:r>
-              <a:rPr lang="fr-FR" sz="3200" dirty="0">
-                <a:latin typeface="+mj-lt"/>
-              </a:rPr>
-              <a:t>Le pied de page</a:t>
-            </a:r>
-          </a:p>
-        </p:txBody>
-      </p:sp>
-    </p:spTree>
-    <p:extLst>
-      <p:ext uri="{BB962C8B-B14F-4D97-AF65-F5344CB8AC3E}">
-        <p14:creationId xmlns:p14="http://schemas.microsoft.com/office/powerpoint/2010/main" val="3288368779"/>
-      </p:ext>
-    </p:extLst>
-  </p:cSld>
-  <p:clrMapOvr>
-    <a:masterClrMapping/>
-  </p:clrMapOvr>
-</p:sld>
-</file>
-
-<file path=ppt/slides/slide11.xml><?xml version="1.0" encoding="utf-8"?>
-<p:sld xmlns:a="http://schemas.openxmlformats.org/drawingml/2006/main" xmlns:r="http://schemas.openxmlformats.org/officeDocument/2006/relationships" xmlns:p="http://schemas.openxmlformats.org/presentationml/2006/main">
-  <p:cSld>
-    <p:bg>
-      <p:bgPr>
-        <a:solidFill>
-          <a:srgbClr val="00B0F0"/>
-        </a:solidFill>
-        <a:effectLst/>
-      </p:bgPr>
-    </p:bg>
-    <p:spTree>
-      <p:nvGrpSpPr>
-        <p:cNvPr id="1" name=""/>
-        <p:cNvGrpSpPr/>
-        <p:nvPr/>
-      </p:nvGrpSpPr>
-      <p:grpSpPr>
-        <a:xfrm>
-          <a:off x="0" y="0"/>
-          <a:ext cx="0" cy="0"/>
-          <a:chOff x="0" y="0"/>
-          <a:chExt cx="0" cy="0"/>
-        </a:xfrm>
-      </p:grpSpPr>
-      <p:sp>
-        <p:nvSpPr>
-          <p:cNvPr id="2" name="Titre 1">
-            <a:extLst>
-              <a:ext uri="{FF2B5EF4-FFF2-40B4-BE49-F238E27FC236}">
-                <a16:creationId xmlns:a16="http://schemas.microsoft.com/office/drawing/2014/main" id="{173A5FD7-5E5B-4F12-BA5C-1AB6C6DA9F1E}"/>
-              </a:ext>
-            </a:extLst>
-          </p:cNvPr>
-          <p:cNvSpPr>
-            <a:spLocks noGrp="1"/>
-          </p:cNvSpPr>
-          <p:nvPr>
-            <p:ph type="title"/>
-          </p:nvPr>
-        </p:nvSpPr>
-        <p:spPr>
-          <a:xfrm>
-            <a:off x="838200" y="365125"/>
-            <a:ext cx="11189677" cy="1325563"/>
-          </a:xfrm>
-        </p:spPr>
-        <p:txBody>
-          <a:bodyPr>
-            <a:normAutofit/>
-          </a:bodyPr>
-          <a:lstStyle/>
-          <a:p>
-            <a:r>
-              <a:rPr lang="fr-FR" altLang="fr-FR" sz="3200" dirty="0">
-                <a:cs typeface="Times New Roman" panose="02020603050405020304" pitchFamily="18" charset="0"/>
-              </a:rPr>
-              <a:t>L’entreprise </a:t>
-            </a:r>
-            <a:r>
-              <a:rPr lang="fr-FR" altLang="fr-FR" sz="3200" dirty="0">
-                <a:ea typeface="Calibri" panose="020F0502020204030204" pitchFamily="34" charset="0"/>
-                <a:cs typeface="Times New Roman" panose="02020603050405020304" pitchFamily="18" charset="0"/>
-              </a:rPr>
-              <a:t>: Presse</a:t>
-            </a:r>
-            <a:endParaRPr lang="fr-FR" sz="3200" dirty="0"/>
-          </a:p>
-        </p:txBody>
-      </p:sp>
-      <p:sp>
-        <p:nvSpPr>
-          <p:cNvPr id="3" name="ZoneTexte 2">
-            <a:extLst>
-              <a:ext uri="{FF2B5EF4-FFF2-40B4-BE49-F238E27FC236}">
-                <a16:creationId xmlns:a16="http://schemas.microsoft.com/office/drawing/2014/main" id="{027CB3A8-775D-4714-BF00-99753B6C6F79}"/>
-              </a:ext>
-            </a:extLst>
-          </p:cNvPr>
-          <p:cNvSpPr txBox="1"/>
-          <p:nvPr/>
-        </p:nvSpPr>
-        <p:spPr>
-          <a:xfrm>
-            <a:off x="1026941" y="1690688"/>
-            <a:ext cx="10522633" cy="2062103"/>
-          </a:xfrm>
-          <a:prstGeom prst="rect">
-            <a:avLst/>
-          </a:prstGeom>
-          <a:noFill/>
-        </p:spPr>
-        <p:txBody>
-          <a:bodyPr wrap="square" rtlCol="0">
-            <a:spAutoFit/>
-          </a:bodyPr>
-          <a:lstStyle/>
-          <a:p>
-            <a:pPr marL="285750" indent="-285750">
-              <a:buFont typeface="Arial" panose="020B0604020202020204" pitchFamily="34" charset="0"/>
-              <a:buChar char="•"/>
-            </a:pPr>
-            <a:r>
-              <a:rPr lang="fr-FR" sz="3200" dirty="0">
-                <a:latin typeface="+mj-lt"/>
-              </a:rPr>
-              <a:t>Section présentation lien contact presse avec l’entreprise</a:t>
-            </a:r>
-          </a:p>
-          <a:p>
-            <a:pPr marL="285750" indent="-285750">
-              <a:buFont typeface="Arial" panose="020B0604020202020204" pitchFamily="34" charset="0"/>
-              <a:buChar char="•"/>
-            </a:pPr>
-            <a:r>
-              <a:rPr lang="fr-FR" sz="3200" dirty="0">
-                <a:latin typeface="+mj-lt"/>
-              </a:rPr>
-              <a:t>Article à la une</a:t>
-            </a:r>
-          </a:p>
-          <a:p>
-            <a:pPr marL="285750" indent="-285750">
-              <a:buFont typeface="Arial" panose="020B0604020202020204" pitchFamily="34" charset="0"/>
-              <a:buChar char="•"/>
-            </a:pPr>
-            <a:r>
-              <a:rPr lang="fr-FR" sz="3200" dirty="0">
-                <a:latin typeface="+mj-lt"/>
-              </a:rPr>
-              <a:t>Médiathèque</a:t>
-            </a:r>
-          </a:p>
-          <a:p>
-            <a:pPr marL="285750" indent="-285750">
-              <a:buFont typeface="Arial" panose="020B0604020202020204" pitchFamily="34" charset="0"/>
-              <a:buChar char="•"/>
-            </a:pPr>
-            <a:r>
-              <a:rPr lang="fr-FR" sz="3200" dirty="0">
-                <a:latin typeface="+mj-lt"/>
-              </a:rPr>
-              <a:t>Le pied de page</a:t>
-            </a:r>
-          </a:p>
-        </p:txBody>
-      </p:sp>
-    </p:spTree>
-    <p:extLst>
-      <p:ext uri="{BB962C8B-B14F-4D97-AF65-F5344CB8AC3E}">
-        <p14:creationId xmlns:p14="http://schemas.microsoft.com/office/powerpoint/2010/main" val="3772829318"/>
-      </p:ext>
-    </p:extLst>
-  </p:cSld>
-  <p:clrMapOvr>
-    <a:masterClrMapping/>
-  </p:clrMapOvr>
-</p:sld>
-</file>
-
-<file path=ppt/slides/slide12.xml><?xml version="1.0" encoding="utf-8"?>
-<p:sld xmlns:a="http://schemas.openxmlformats.org/drawingml/2006/main" xmlns:r="http://schemas.openxmlformats.org/officeDocument/2006/relationships" xmlns:p="http://schemas.openxmlformats.org/presentationml/2006/main">
-  <p:cSld>
-    <p:bg>
-      <p:bgPr>
-        <a:solidFill>
-          <a:schemeClr val="accent2">
-            <a:lumMod val="40000"/>
-            <a:lumOff val="60000"/>
-          </a:schemeClr>
-        </a:solidFill>
-        <a:effectLst/>
-      </p:bgPr>
-    </p:bg>
-    <p:spTree>
-      <p:nvGrpSpPr>
-        <p:cNvPr id="1" name=""/>
-        <p:cNvGrpSpPr/>
-        <p:nvPr/>
-      </p:nvGrpSpPr>
-      <p:grpSpPr>
-        <a:xfrm>
-          <a:off x="0" y="0"/>
-          <a:ext cx="0" cy="0"/>
-          <a:chOff x="0" y="0"/>
-          <a:chExt cx="0" cy="0"/>
-        </a:xfrm>
-      </p:grpSpPr>
-      <p:sp>
-        <p:nvSpPr>
-          <p:cNvPr id="2" name="Titre 1">
-            <a:extLst>
-              <a:ext uri="{FF2B5EF4-FFF2-40B4-BE49-F238E27FC236}">
-                <a16:creationId xmlns:a16="http://schemas.microsoft.com/office/drawing/2014/main" id="{173A5FD7-5E5B-4F12-BA5C-1AB6C6DA9F1E}"/>
-              </a:ext>
-            </a:extLst>
-          </p:cNvPr>
-          <p:cNvSpPr>
-            <a:spLocks noGrp="1"/>
-          </p:cNvSpPr>
-          <p:nvPr>
-            <p:ph type="title"/>
-          </p:nvPr>
-        </p:nvSpPr>
-        <p:spPr>
-          <a:xfrm>
-            <a:off x="838200" y="365125"/>
-            <a:ext cx="11189677" cy="1325563"/>
-          </a:xfrm>
-        </p:spPr>
-        <p:txBody>
-          <a:bodyPr>
-            <a:normAutofit/>
-          </a:bodyPr>
-          <a:lstStyle/>
-          <a:p>
-            <a:r>
-              <a:rPr lang="fr-FR" altLang="fr-FR" sz="3200" dirty="0">
-                <a:cs typeface="Times New Roman" panose="02020603050405020304" pitchFamily="18" charset="0"/>
-              </a:rPr>
-              <a:t>Aide &amp; FAQ</a:t>
-            </a:r>
-            <a:endParaRPr lang="fr-FR" sz="3200" dirty="0"/>
-          </a:p>
-        </p:txBody>
-      </p:sp>
-      <p:sp>
-        <p:nvSpPr>
-          <p:cNvPr id="3" name="ZoneTexte 2">
-            <a:extLst>
-              <a:ext uri="{FF2B5EF4-FFF2-40B4-BE49-F238E27FC236}">
-                <a16:creationId xmlns:a16="http://schemas.microsoft.com/office/drawing/2014/main" id="{027CB3A8-775D-4714-BF00-99753B6C6F79}"/>
-              </a:ext>
-            </a:extLst>
-          </p:cNvPr>
-          <p:cNvSpPr txBox="1"/>
-          <p:nvPr/>
-        </p:nvSpPr>
-        <p:spPr>
-          <a:xfrm>
-            <a:off x="1026941" y="1690688"/>
-            <a:ext cx="10522633" cy="2554545"/>
-          </a:xfrm>
-          <a:prstGeom prst="rect">
-            <a:avLst/>
-          </a:prstGeom>
-          <a:noFill/>
-        </p:spPr>
-        <p:txBody>
-          <a:bodyPr wrap="square" rtlCol="0">
-            <a:spAutoFit/>
-          </a:bodyPr>
-          <a:lstStyle/>
-          <a:p>
-            <a:pPr marL="285750" indent="-285750">
-              <a:buFont typeface="Arial" panose="020B0604020202020204" pitchFamily="34" charset="0"/>
-              <a:buChar char="•"/>
-            </a:pPr>
-            <a:r>
-              <a:rPr lang="fr-FR" sz="3200" dirty="0">
-                <a:latin typeface="+mj-lt"/>
-              </a:rPr>
-              <a:t>Section aide concernant réservations</a:t>
-            </a:r>
-          </a:p>
-          <a:p>
-            <a:pPr marL="285750" indent="-285750">
-              <a:buFont typeface="Arial" panose="020B0604020202020204" pitchFamily="34" charset="0"/>
-              <a:buChar char="•"/>
-            </a:pPr>
-            <a:r>
-              <a:rPr lang="fr-FR" sz="3200" dirty="0">
-                <a:latin typeface="+mj-lt"/>
-              </a:rPr>
-              <a:t>Section aide concernant les payements</a:t>
-            </a:r>
-          </a:p>
-          <a:p>
-            <a:pPr marL="285750" indent="-285750">
-              <a:buFont typeface="Arial" panose="020B0604020202020204" pitchFamily="34" charset="0"/>
-              <a:buChar char="•"/>
-            </a:pPr>
-            <a:r>
-              <a:rPr lang="fr-FR" sz="3200" dirty="0">
-                <a:latin typeface="+mj-lt"/>
-              </a:rPr>
-              <a:t>Section aide concernant le voyages : sièges, arrêts, imprévus</a:t>
-            </a:r>
-          </a:p>
-          <a:p>
-            <a:pPr marL="285750" indent="-285750">
-              <a:buFont typeface="Arial" panose="020B0604020202020204" pitchFamily="34" charset="0"/>
-              <a:buChar char="•"/>
-            </a:pPr>
-            <a:r>
-              <a:rPr lang="fr-FR" sz="3200" dirty="0">
-                <a:latin typeface="+mj-lt"/>
-              </a:rPr>
-              <a:t>Devenir partenaires</a:t>
-            </a:r>
-          </a:p>
-          <a:p>
-            <a:pPr marL="285750" indent="-285750">
-              <a:buFont typeface="Arial" panose="020B0604020202020204" pitchFamily="34" charset="0"/>
-              <a:buChar char="•"/>
-            </a:pPr>
-            <a:r>
-              <a:rPr lang="fr-FR" sz="3200" dirty="0">
-                <a:latin typeface="+mj-lt"/>
-              </a:rPr>
-              <a:t>Le pied de page</a:t>
-            </a:r>
-          </a:p>
-        </p:txBody>
-      </p:sp>
-    </p:spTree>
-    <p:extLst>
-      <p:ext uri="{BB962C8B-B14F-4D97-AF65-F5344CB8AC3E}">
-        <p14:creationId xmlns:p14="http://schemas.microsoft.com/office/powerpoint/2010/main" val="2086402098"/>
-      </p:ext>
-    </p:extLst>
-  </p:cSld>
-  <p:clrMapOvr>
-    <a:masterClrMapping/>
-  </p:clrMapOvr>
-</p:sld>
-</file>
-
-<file path=ppt/slides/slide13.xml><?xml version="1.0" encoding="utf-8"?>
-<p:sld xmlns:a="http://schemas.openxmlformats.org/drawingml/2006/main" xmlns:r="http://schemas.openxmlformats.org/officeDocument/2006/relationships" xmlns:p="http://schemas.openxmlformats.org/presentationml/2006/main">
-  <p:cSld>
-    <p:bg>
-      <p:bgPr>
-        <a:solidFill>
-          <a:schemeClr val="accent3"/>
-        </a:solidFill>
-        <a:effectLst/>
-      </p:bgPr>
-    </p:bg>
-    <p:spTree>
-      <p:nvGrpSpPr>
-        <p:cNvPr id="1" name=""/>
-        <p:cNvGrpSpPr/>
-        <p:nvPr/>
-      </p:nvGrpSpPr>
-      <p:grpSpPr>
-        <a:xfrm>
-          <a:off x="0" y="0"/>
-          <a:ext cx="0" cy="0"/>
-          <a:chOff x="0" y="0"/>
-          <a:chExt cx="0" cy="0"/>
-        </a:xfrm>
-      </p:grpSpPr>
-      <p:sp>
-        <p:nvSpPr>
-          <p:cNvPr id="2" name="Titre 1">
-            <a:extLst>
-              <a:ext uri="{FF2B5EF4-FFF2-40B4-BE49-F238E27FC236}">
-                <a16:creationId xmlns:a16="http://schemas.microsoft.com/office/drawing/2014/main" id="{173A5FD7-5E5B-4F12-BA5C-1AB6C6DA9F1E}"/>
-              </a:ext>
-            </a:extLst>
-          </p:cNvPr>
-          <p:cNvSpPr>
-            <a:spLocks noGrp="1"/>
-          </p:cNvSpPr>
-          <p:nvPr>
-            <p:ph type="title"/>
-          </p:nvPr>
-        </p:nvSpPr>
-        <p:spPr>
-          <a:xfrm>
-            <a:off x="838200" y="365125"/>
-            <a:ext cx="11189677" cy="1325563"/>
-          </a:xfrm>
-        </p:spPr>
-        <p:txBody>
-          <a:bodyPr>
-            <a:normAutofit/>
-          </a:bodyPr>
-          <a:lstStyle/>
-          <a:p>
-            <a:r>
-              <a:rPr lang="fr-FR" altLang="fr-FR" sz="3200">
-                <a:cs typeface="Times New Roman" panose="02020603050405020304" pitchFamily="18" charset="0"/>
-              </a:rPr>
-              <a:t>LOG-IN</a:t>
-            </a:r>
-            <a:endParaRPr lang="fr-FR" sz="3200" dirty="0"/>
-          </a:p>
-        </p:txBody>
-      </p:sp>
-      <p:sp>
-        <p:nvSpPr>
-          <p:cNvPr id="3" name="ZoneTexte 2">
-            <a:extLst>
-              <a:ext uri="{FF2B5EF4-FFF2-40B4-BE49-F238E27FC236}">
-                <a16:creationId xmlns:a16="http://schemas.microsoft.com/office/drawing/2014/main" id="{027CB3A8-775D-4714-BF00-99753B6C6F79}"/>
-              </a:ext>
-            </a:extLst>
-          </p:cNvPr>
-          <p:cNvSpPr txBox="1"/>
-          <p:nvPr/>
-        </p:nvSpPr>
-        <p:spPr>
-          <a:xfrm>
-            <a:off x="1026941" y="1690688"/>
-            <a:ext cx="10522633" cy="1569660"/>
-          </a:xfrm>
-          <a:prstGeom prst="rect">
-            <a:avLst/>
-          </a:prstGeom>
-          <a:noFill/>
-        </p:spPr>
-        <p:txBody>
-          <a:bodyPr wrap="square" rtlCol="0">
-            <a:spAutoFit/>
-          </a:bodyPr>
-          <a:lstStyle/>
-          <a:p>
-            <a:pPr marL="285750" indent="-285750">
-              <a:buFont typeface="Arial" panose="020B0604020202020204" pitchFamily="34" charset="0"/>
-              <a:buChar char="•"/>
-            </a:pPr>
-            <a:r>
-              <a:rPr lang="fr-FR" sz="3200" dirty="0">
-                <a:latin typeface="+mj-lt"/>
-              </a:rPr>
-              <a:t>Façade connexion / inscription pour clients et agences démarchages</a:t>
-            </a:r>
-          </a:p>
-          <a:p>
-            <a:pPr marL="285750" indent="-285750">
-              <a:buFont typeface="Arial" panose="020B0604020202020204" pitchFamily="34" charset="0"/>
-              <a:buChar char="•"/>
-            </a:pPr>
-            <a:r>
-              <a:rPr lang="fr-FR" sz="3200" dirty="0">
-                <a:latin typeface="+mj-lt"/>
-              </a:rPr>
-              <a:t>Le pied de page</a:t>
-            </a:r>
-          </a:p>
-        </p:txBody>
-      </p:sp>
-    </p:spTree>
-    <p:extLst>
-      <p:ext uri="{BB962C8B-B14F-4D97-AF65-F5344CB8AC3E}">
-        <p14:creationId xmlns:p14="http://schemas.microsoft.com/office/powerpoint/2010/main" val="4294409896"/>
-      </p:ext>
-    </p:extLst>
-  </p:cSld>
-  <p:clrMapOvr>
-    <a:masterClrMapping/>
-  </p:clrMapOvr>
-</p:sld>
-</file>
-
-<file path=ppt/slides/slide2.xml><?xml version="1.0" encoding="utf-8"?>
+<file path=ppt/slides/slide4.xml><?xml version="1.0" encoding="utf-8"?>
 <p:sld xmlns:a="http://schemas.openxmlformats.org/drawingml/2006/main" xmlns:r="http://schemas.openxmlformats.org/officeDocument/2006/relationships" xmlns:p="http://schemas.openxmlformats.org/presentationml/2006/main">
   <p:cSld>
     <p:bg>
@@ -6387,304 +7040,6 @@
     <p:extLst>
       <p:ext uri="{BB962C8B-B14F-4D97-AF65-F5344CB8AC3E}">
         <p14:creationId xmlns:p14="http://schemas.microsoft.com/office/powerpoint/2010/main" val="3579107703"/>
-      </p:ext>
-    </p:extLst>
-  </p:cSld>
-  <p:clrMapOvr>
-    <a:masterClrMapping/>
-  </p:clrMapOvr>
-</p:sld>
-</file>
-
-<file path=ppt/slides/slide3.xml><?xml version="1.0" encoding="utf-8"?>
-<p:sld xmlns:a="http://schemas.openxmlformats.org/drawingml/2006/main" xmlns:r="http://schemas.openxmlformats.org/officeDocument/2006/relationships" xmlns:p="http://schemas.openxmlformats.org/presentationml/2006/main">
-  <p:cSld>
-    <p:bg>
-      <p:bgPr>
-        <a:solidFill>
-          <a:srgbClr val="92D050"/>
-        </a:solidFill>
-        <a:effectLst/>
-      </p:bgPr>
-    </p:bg>
-    <p:spTree>
-      <p:nvGrpSpPr>
-        <p:cNvPr id="1" name=""/>
-        <p:cNvGrpSpPr/>
-        <p:nvPr/>
-      </p:nvGrpSpPr>
-      <p:grpSpPr>
-        <a:xfrm>
-          <a:off x="0" y="0"/>
-          <a:ext cx="0" cy="0"/>
-          <a:chOff x="0" y="0"/>
-          <a:chExt cx="0" cy="0"/>
-        </a:xfrm>
-      </p:grpSpPr>
-      <p:sp>
-        <p:nvSpPr>
-          <p:cNvPr id="2" name="Titre 1">
-            <a:extLst>
-              <a:ext uri="{FF2B5EF4-FFF2-40B4-BE49-F238E27FC236}">
-                <a16:creationId xmlns:a16="http://schemas.microsoft.com/office/drawing/2014/main" id="{173A5FD7-5E5B-4F12-BA5C-1AB6C6DA9F1E}"/>
-              </a:ext>
-            </a:extLst>
-          </p:cNvPr>
-          <p:cNvSpPr>
-            <a:spLocks noGrp="1"/>
-          </p:cNvSpPr>
-          <p:nvPr>
-            <p:ph type="title"/>
-          </p:nvPr>
-        </p:nvSpPr>
-        <p:spPr/>
-        <p:txBody>
-          <a:bodyPr/>
-          <a:lstStyle/>
-          <a:p>
-            <a:r>
-              <a:rPr lang="fr-FR" altLang="fr-FR" sz="3200" dirty="0"/>
-              <a:t>Organiser votre voyage : Réserver</a:t>
-            </a:r>
-            <a:endParaRPr lang="fr-FR" sz="3200" dirty="0"/>
-          </a:p>
-        </p:txBody>
-      </p:sp>
-      <p:sp>
-        <p:nvSpPr>
-          <p:cNvPr id="3" name="ZoneTexte 2">
-            <a:extLst>
-              <a:ext uri="{FF2B5EF4-FFF2-40B4-BE49-F238E27FC236}">
-                <a16:creationId xmlns:a16="http://schemas.microsoft.com/office/drawing/2014/main" id="{027CB3A8-775D-4714-BF00-99753B6C6F79}"/>
-              </a:ext>
-            </a:extLst>
-          </p:cNvPr>
-          <p:cNvSpPr txBox="1"/>
-          <p:nvPr/>
-        </p:nvSpPr>
-        <p:spPr>
-          <a:xfrm>
-            <a:off x="1026942" y="1690688"/>
-            <a:ext cx="9411286" cy="1421928"/>
-          </a:xfrm>
-          <a:prstGeom prst="rect">
-            <a:avLst/>
-          </a:prstGeom>
-          <a:noFill/>
-        </p:spPr>
-        <p:txBody>
-          <a:bodyPr wrap="square" rtlCol="0">
-            <a:spAutoFit/>
-          </a:bodyPr>
-          <a:lstStyle/>
-          <a:p>
-            <a:pPr marL="457200" indent="-457200">
-              <a:lnSpc>
-                <a:spcPct val="90000"/>
-              </a:lnSpc>
-              <a:spcBef>
-                <a:spcPct val="0"/>
-              </a:spcBef>
-              <a:buFont typeface="Arial" panose="020B0604020202020204" pitchFamily="34" charset="0"/>
-              <a:buChar char="•"/>
-            </a:pPr>
-            <a:r>
-              <a:rPr lang="fr-FR" sz="3200" dirty="0">
-                <a:latin typeface="+mj-lt"/>
-                <a:ea typeface="+mj-ea"/>
-                <a:cs typeface="+mj-cs"/>
-              </a:rPr>
-              <a:t>Section recherche de bus</a:t>
-            </a:r>
-          </a:p>
-          <a:p>
-            <a:pPr marL="457200" indent="-457200">
-              <a:lnSpc>
-                <a:spcPct val="90000"/>
-              </a:lnSpc>
-              <a:spcBef>
-                <a:spcPct val="0"/>
-              </a:spcBef>
-              <a:buFont typeface="Arial" panose="020B0604020202020204" pitchFamily="34" charset="0"/>
-              <a:buChar char="•"/>
-            </a:pPr>
-            <a:r>
-              <a:rPr lang="fr-FR" sz="3200" dirty="0">
-                <a:latin typeface="+mj-lt"/>
-                <a:ea typeface="+mj-ea"/>
-                <a:cs typeface="+mj-cs"/>
-              </a:rPr>
-              <a:t>Section comment ça marche</a:t>
-            </a:r>
-          </a:p>
-          <a:p>
-            <a:pPr marL="457200" indent="-457200">
-              <a:lnSpc>
-                <a:spcPct val="90000"/>
-              </a:lnSpc>
-              <a:spcBef>
-                <a:spcPct val="0"/>
-              </a:spcBef>
-              <a:buFont typeface="Arial" panose="020B0604020202020204" pitchFamily="34" charset="0"/>
-              <a:buChar char="•"/>
-            </a:pPr>
-            <a:r>
-              <a:rPr lang="fr-FR" sz="3200" dirty="0">
-                <a:latin typeface="+mj-lt"/>
-                <a:ea typeface="+mj-ea"/>
-                <a:cs typeface="+mj-cs"/>
-              </a:rPr>
-              <a:t>Pied de page</a:t>
-            </a:r>
-          </a:p>
-        </p:txBody>
-      </p:sp>
-    </p:spTree>
-    <p:extLst>
-      <p:ext uri="{BB962C8B-B14F-4D97-AF65-F5344CB8AC3E}">
-        <p14:creationId xmlns:p14="http://schemas.microsoft.com/office/powerpoint/2010/main" val="3351845272"/>
-      </p:ext>
-    </p:extLst>
-  </p:cSld>
-  <p:clrMapOvr>
-    <a:masterClrMapping/>
-  </p:clrMapOvr>
-</p:sld>
-</file>
-
-<file path=ppt/slides/slide4.xml><?xml version="1.0" encoding="utf-8"?>
-<p:sld xmlns:a="http://schemas.openxmlformats.org/drawingml/2006/main" xmlns:r="http://schemas.openxmlformats.org/officeDocument/2006/relationships" xmlns:p="http://schemas.openxmlformats.org/presentationml/2006/main">
-  <p:cSld>
-    <p:bg>
-      <p:bgPr>
-        <a:solidFill>
-          <a:srgbClr val="92D050"/>
-        </a:solidFill>
-        <a:effectLst/>
-      </p:bgPr>
-    </p:bg>
-    <p:spTree>
-      <p:nvGrpSpPr>
-        <p:cNvPr id="1" name=""/>
-        <p:cNvGrpSpPr/>
-        <p:nvPr/>
-      </p:nvGrpSpPr>
-      <p:grpSpPr>
-        <a:xfrm>
-          <a:off x="0" y="0"/>
-          <a:ext cx="0" cy="0"/>
-          <a:chOff x="0" y="0"/>
-          <a:chExt cx="0" cy="0"/>
-        </a:xfrm>
-      </p:grpSpPr>
-      <p:sp>
-        <p:nvSpPr>
-          <p:cNvPr id="2" name="Titre 1">
-            <a:extLst>
-              <a:ext uri="{FF2B5EF4-FFF2-40B4-BE49-F238E27FC236}">
-                <a16:creationId xmlns:a16="http://schemas.microsoft.com/office/drawing/2014/main" id="{173A5FD7-5E5B-4F12-BA5C-1AB6C6DA9F1E}"/>
-              </a:ext>
-            </a:extLst>
-          </p:cNvPr>
-          <p:cNvSpPr>
-            <a:spLocks noGrp="1"/>
-          </p:cNvSpPr>
-          <p:nvPr>
-            <p:ph type="title"/>
-          </p:nvPr>
-        </p:nvSpPr>
-        <p:spPr>
-          <a:xfrm>
-            <a:off x="838200" y="365125"/>
-            <a:ext cx="11189677" cy="1325563"/>
-          </a:xfrm>
-        </p:spPr>
-        <p:txBody>
-          <a:bodyPr>
-            <a:normAutofit/>
-          </a:bodyPr>
-          <a:lstStyle/>
-          <a:p>
-            <a:r>
-              <a:rPr lang="fr-FR" altLang="fr-FR" sz="3200" dirty="0">
-                <a:ea typeface="Calibri" panose="020F0502020204030204" pitchFamily="34" charset="0"/>
-                <a:cs typeface="Times New Roman" panose="02020603050405020304" pitchFamily="18" charset="0"/>
-              </a:rPr>
-              <a:t>Organiser votre voyage : Découvrir destinations</a:t>
-            </a:r>
-            <a:endParaRPr lang="fr-FR" sz="3200" dirty="0"/>
-          </a:p>
-        </p:txBody>
-      </p:sp>
-      <p:sp>
-        <p:nvSpPr>
-          <p:cNvPr id="3" name="ZoneTexte 2">
-            <a:extLst>
-              <a:ext uri="{FF2B5EF4-FFF2-40B4-BE49-F238E27FC236}">
-                <a16:creationId xmlns:a16="http://schemas.microsoft.com/office/drawing/2014/main" id="{027CB3A8-775D-4714-BF00-99753B6C6F79}"/>
-              </a:ext>
-            </a:extLst>
-          </p:cNvPr>
-          <p:cNvSpPr txBox="1"/>
-          <p:nvPr/>
-        </p:nvSpPr>
-        <p:spPr>
-          <a:xfrm>
-            <a:off x="1026941" y="1690688"/>
-            <a:ext cx="10522633" cy="2062103"/>
-          </a:xfrm>
-          <a:prstGeom prst="rect">
-            <a:avLst/>
-          </a:prstGeom>
-          <a:noFill/>
-        </p:spPr>
-        <p:txBody>
-          <a:bodyPr wrap="square" rtlCol="0">
-            <a:spAutoFit/>
-          </a:bodyPr>
-          <a:lstStyle/>
-          <a:p>
-            <a:pPr marL="285750" indent="-285750">
-              <a:buFont typeface="Arial" panose="020B0604020202020204" pitchFamily="34" charset="0"/>
-              <a:buChar char="•"/>
-            </a:pPr>
-            <a:r>
-              <a:rPr lang="fr-FR" sz="3200" dirty="0">
-                <a:latin typeface="+mj-lt"/>
-              </a:rPr>
-              <a:t>Section présentation rapide des destinations principales : Abidjan, Bouaké, Yamoussoukro, Daloa…</a:t>
-            </a:r>
-          </a:p>
-          <a:p>
-            <a:pPr marL="285750" indent="-285750">
-              <a:buFont typeface="Arial" panose="020B0604020202020204" pitchFamily="34" charset="0"/>
-              <a:buChar char="•"/>
-            </a:pPr>
-            <a:r>
-              <a:rPr lang="fr-FR" sz="3200" dirty="0">
-                <a:latin typeface="+mj-lt"/>
-              </a:rPr>
-              <a:t>Section recherches destinations possibles </a:t>
-            </a:r>
-          </a:p>
-          <a:p>
-            <a:pPr marL="285750" indent="-285750">
-              <a:buFont typeface="Arial" panose="020B0604020202020204" pitchFamily="34" charset="0"/>
-              <a:buChar char="•"/>
-            </a:pPr>
-            <a:r>
-              <a:rPr lang="fr-FR" sz="3200" dirty="0">
-                <a:latin typeface="+mj-lt"/>
-              </a:rPr>
-              <a:t>Pied de page</a:t>
-            </a:r>
-          </a:p>
-        </p:txBody>
-      </p:sp>
-    </p:spTree>
-    <p:extLst>
-      <p:ext uri="{BB962C8B-B14F-4D97-AF65-F5344CB8AC3E}">
-        <p14:creationId xmlns:p14="http://schemas.microsoft.com/office/powerpoint/2010/main" val="633265421"/>
       </p:ext>
     </p:extLst>
   </p:cSld>
@@ -6735,24 +7090,14 @@
             <p:ph type="title"/>
           </p:nvPr>
         </p:nvSpPr>
-        <p:spPr>
-          <a:xfrm>
-            <a:off x="838200" y="365125"/>
-            <a:ext cx="11189677" cy="1325563"/>
-          </a:xfrm>
-        </p:spPr>
-        <p:txBody>
-          <a:bodyPr>
-            <a:normAutofit/>
-          </a:bodyPr>
-          <a:lstStyle/>
-          <a:p>
-            <a:r>
-              <a:rPr lang="fr-FR" altLang="fr-FR" sz="3200" dirty="0">
-                <a:ea typeface="Calibri" panose="020F0502020204030204" pitchFamily="34" charset="0"/>
-                <a:cs typeface="Times New Roman" panose="02020603050405020304" pitchFamily="18" charset="0"/>
-              </a:rPr>
-              <a:t>Organiser votre voyage : Compagnies et gares</a:t>
+        <p:spPr/>
+        <p:txBody>
+          <a:bodyPr/>
+          <a:lstStyle/>
+          <a:p>
+            <a:r>
+              <a:rPr lang="fr-FR" altLang="fr-FR" sz="3200" dirty="0"/>
+              <a:t>Organiser votre voyage : Réserver</a:t>
             </a:r>
             <a:endParaRPr lang="fr-FR" sz="3200" dirty="0"/>
           </a:p>
@@ -6772,8 +7117,8 @@
         </p:nvSpPr>
         <p:spPr>
           <a:xfrm>
-            <a:off x="1026941" y="1690688"/>
-            <a:ext cx="10522633" cy="2554545"/>
+            <a:off x="1026942" y="1690688"/>
+            <a:ext cx="9411286" cy="1421928"/>
           </a:xfrm>
           <a:prstGeom prst="rect">
             <a:avLst/>
@@ -6786,49 +7131,61 @@
           </a:bodyPr>
           <a:lstStyle/>
           <a:p>
-            <a:pPr marL="285750" indent="-285750">
+            <a:pPr marL="457200" indent="-457200">
+              <a:lnSpc>
+                <a:spcPct val="90000"/>
+              </a:lnSpc>
+              <a:spcBef>
+                <a:spcPct val="0"/>
+              </a:spcBef>
               <a:buFont typeface="Arial" panose="020B0604020202020204" pitchFamily="34" charset="0"/>
               <a:buChar char="•"/>
             </a:pPr>
             <a:r>
               <a:rPr lang="fr-FR" sz="3200" dirty="0">
                 <a:latin typeface="+mj-lt"/>
+                <a:ea typeface="+mj-ea"/>
+                <a:cs typeface="+mj-cs"/>
               </a:rPr>
-              <a:t>Section présentation rapide des principales compagnies : UTB, UTS, STIF, Léopard…</a:t>
-            </a:r>
-          </a:p>
-          <a:p>
-            <a:pPr marL="285750" indent="-285750">
+              <a:t>Section recherche de bus</a:t>
+            </a:r>
+          </a:p>
+          <a:p>
+            <a:pPr marL="457200" indent="-457200">
+              <a:lnSpc>
+                <a:spcPct val="90000"/>
+              </a:lnSpc>
+              <a:spcBef>
+                <a:spcPct val="0"/>
+              </a:spcBef>
               <a:buFont typeface="Arial" panose="020B0604020202020204" pitchFamily="34" charset="0"/>
               <a:buChar char="•"/>
             </a:pPr>
             <a:r>
               <a:rPr lang="fr-FR" sz="3200" dirty="0">
                 <a:latin typeface="+mj-lt"/>
+                <a:ea typeface="+mj-ea"/>
+                <a:cs typeface="+mj-cs"/>
               </a:rPr>
-              <a:t>Section bar de recherche de compagnies</a:t>
-            </a:r>
-          </a:p>
-          <a:p>
-            <a:pPr marL="285750" indent="-285750">
+              <a:t>Section comment ça marche</a:t>
+            </a:r>
+          </a:p>
+          <a:p>
+            <a:pPr marL="457200" indent="-457200">
+              <a:lnSpc>
+                <a:spcPct val="90000"/>
+              </a:lnSpc>
+              <a:spcBef>
+                <a:spcPct val="0"/>
+              </a:spcBef>
               <a:buFont typeface="Arial" panose="020B0604020202020204" pitchFamily="34" charset="0"/>
               <a:buChar char="•"/>
             </a:pPr>
             <a:r>
               <a:rPr lang="fr-FR" sz="3200" dirty="0">
                 <a:latin typeface="+mj-lt"/>
-              </a:rPr>
-              <a:t>Section recherche ville  + gare dispo dans chaque ville</a:t>
-            </a:r>
-          </a:p>
-          <a:p>
-            <a:pPr marL="285750" indent="-285750">
-              <a:buFont typeface="Arial" panose="020B0604020202020204" pitchFamily="34" charset="0"/>
-              <a:buChar char="•"/>
-            </a:pPr>
-            <a:r>
-              <a:rPr lang="fr-FR" sz="3200" dirty="0">
-                <a:latin typeface="+mj-lt"/>
+                <a:ea typeface="+mj-ea"/>
+                <a:cs typeface="+mj-cs"/>
               </a:rPr>
               <a:t>Pied de page</a:t>
             </a:r>
@@ -6838,7 +7195,7 @@
     </p:spTree>
     <p:extLst>
       <p:ext uri="{BB962C8B-B14F-4D97-AF65-F5344CB8AC3E}">
-        <p14:creationId xmlns:p14="http://schemas.microsoft.com/office/powerpoint/2010/main" val="3115430321"/>
+        <p14:creationId xmlns:p14="http://schemas.microsoft.com/office/powerpoint/2010/main" val="3351845272"/>
       </p:ext>
     </p:extLst>
   </p:cSld>
@@ -6854,7 +7211,7 @@
     <p:bg>
       <p:bgPr>
         <a:solidFill>
-          <a:srgbClr val="FFC000"/>
+          <a:srgbClr val="92D050"/>
         </a:solidFill>
         <a:effectLst/>
       </p:bgPr>
@@ -6903,16 +7260,10 @@
           <a:p>
             <a:r>
               <a:rPr lang="fr-FR" altLang="fr-FR" sz="3200" dirty="0">
-                <a:cs typeface="Times New Roman" panose="02020603050405020304" pitchFamily="18" charset="0"/>
-              </a:rPr>
-              <a:t>Services izyGO </a:t>
-            </a:r>
-            <a:r>
-              <a:rPr lang="fr-FR" altLang="fr-FR" sz="3200" dirty="0">
                 <a:ea typeface="Calibri" panose="020F0502020204030204" pitchFamily="34" charset="0"/>
                 <a:cs typeface="Times New Roman" panose="02020603050405020304" pitchFamily="18" charset="0"/>
               </a:rPr>
-              <a:t>: Gérer ma réservation</a:t>
+              <a:t>Organiser votre voyage : Découvrir destinations</a:t>
             </a:r>
             <a:endParaRPr lang="fr-FR" sz="3200" dirty="0"/>
           </a:p>
@@ -6933,7 +7284,7 @@
         <p:spPr>
           <a:xfrm>
             <a:off x="1026941" y="1690688"/>
-            <a:ext cx="10522633" cy="1569660"/>
+            <a:ext cx="10522633" cy="2062103"/>
           </a:xfrm>
           <a:prstGeom prst="rect">
             <a:avLst/>
@@ -6954,7 +7305,7 @@
               <a:rPr lang="fr-FR" sz="3200" dirty="0">
                 <a:latin typeface="+mj-lt"/>
               </a:rPr>
-              <a:t>Section modification de la réservation avec les conditions</a:t>
+              <a:t>Section présentation rapide des destinations principales : Abidjan, Bouaké, Yamoussoukro, Daloa…</a:t>
             </a:r>
           </a:p>
           <a:p>
@@ -6966,7 +7317,7 @@
               <a:rPr lang="fr-FR" sz="3200" dirty="0">
                 <a:latin typeface="+mj-lt"/>
               </a:rPr>
-              <a:t>Section Annulation de la réservation avec les conditions</a:t>
+              <a:t>Section recherches destinations possibles </a:t>
             </a:r>
           </a:p>
           <a:p>
@@ -6986,7 +7337,7 @@
     </p:spTree>
     <p:extLst>
       <p:ext uri="{BB962C8B-B14F-4D97-AF65-F5344CB8AC3E}">
-        <p14:creationId xmlns:p14="http://schemas.microsoft.com/office/powerpoint/2010/main" val="3364710369"/>
+        <p14:creationId xmlns:p14="http://schemas.microsoft.com/office/powerpoint/2010/main" val="633265421"/>
       </p:ext>
     </p:extLst>
   </p:cSld>
@@ -7002,7 +7353,7 @@
     <p:bg>
       <p:bgPr>
         <a:solidFill>
-          <a:srgbClr val="FFC000"/>
+          <a:srgbClr val="92D050"/>
         </a:solidFill>
         <a:effectLst/>
       </p:bgPr>
@@ -7051,16 +7402,10 @@
           <a:p>
             <a:r>
               <a:rPr lang="fr-FR" altLang="fr-FR" sz="3200" dirty="0">
-                <a:cs typeface="Times New Roman" panose="02020603050405020304" pitchFamily="18" charset="0"/>
-              </a:rPr>
-              <a:t>Services izyGO </a:t>
-            </a:r>
-            <a:r>
-              <a:rPr lang="fr-FR" altLang="fr-FR" sz="3200" dirty="0">
                 <a:ea typeface="Calibri" panose="020F0502020204030204" pitchFamily="34" charset="0"/>
                 <a:cs typeface="Times New Roman" panose="02020603050405020304" pitchFamily="18" charset="0"/>
               </a:rPr>
-              <a:t>: Points de ventes</a:t>
+              <a:t>Organiser votre voyage : Compagnies et gares</a:t>
             </a:r>
             <a:endParaRPr lang="fr-FR" sz="3200" dirty="0"/>
           </a:p>
@@ -7081,7 +7426,7 @@
         <p:spPr>
           <a:xfrm>
             <a:off x="1026941" y="1690688"/>
-            <a:ext cx="10522633" cy="1569660"/>
+            <a:ext cx="10522633" cy="2554545"/>
           </a:xfrm>
           <a:prstGeom prst="rect">
             <a:avLst/>
@@ -7102,7 +7447,7 @@
               <a:rPr lang="fr-FR" sz="3200" dirty="0">
                 <a:latin typeface="+mj-lt"/>
               </a:rPr>
-              <a:t>Section présentation rapide des principaux points de ventes</a:t>
+              <a:t>Section présentation rapide des principales compagnies : UTB, UTS, STIF, Léopard…</a:t>
             </a:r>
           </a:p>
           <a:p>
@@ -7114,7 +7459,7 @@
               <a:rPr lang="fr-FR" sz="3200" dirty="0">
                 <a:latin typeface="+mj-lt"/>
               </a:rPr>
-              <a:t>Section recherche de points de ventes avec slider maps</a:t>
+              <a:t>Section bar de recherche de compagnies</a:t>
             </a:r>
           </a:p>
           <a:p>
@@ -7126,7 +7471,19 @@
               <a:rPr lang="fr-FR" sz="3200" dirty="0">
                 <a:latin typeface="+mj-lt"/>
               </a:rPr>
-              <a:t>Le pied de page</a:t>
+              <a:t>Section recherche ville  + gare dispo dans chaque ville</a:t>
+            </a:r>
+          </a:p>
+          <a:p>
+            <a:pPr marL="285750" indent="-285750">
+              <a:buFont typeface="Arial" panose="020B0604020202020204" pitchFamily="34" charset="0"/>
+              <a:buChar char="•"/>
+            </a:pPr>
+            <a:r>
+              <a:rPr lang="fr-FR" sz="3200" dirty="0">
+                <a:latin typeface="+mj-lt"/>
+              </a:rPr>
+              <a:t>Pied de page</a:t>
             </a:r>
           </a:p>
         </p:txBody>
@@ -7134,7 +7491,7 @@
     </p:spTree>
     <p:extLst>
       <p:ext uri="{BB962C8B-B14F-4D97-AF65-F5344CB8AC3E}">
-        <p14:creationId xmlns:p14="http://schemas.microsoft.com/office/powerpoint/2010/main" val="2367907844"/>
+        <p14:creationId xmlns:p14="http://schemas.microsoft.com/office/powerpoint/2010/main" val="3115430321"/>
       </p:ext>
     </p:extLst>
   </p:cSld>
@@ -7208,7 +7565,7 @@
                 <a:ea typeface="Calibri" panose="020F0502020204030204" pitchFamily="34" charset="0"/>
                 <a:cs typeface="Times New Roman" panose="02020603050405020304" pitchFamily="18" charset="0"/>
               </a:rPr>
-              <a:t>: Louer un bus</a:t>
+              <a:t>: Gérer ma réservation</a:t>
             </a:r>
             <a:endParaRPr lang="fr-FR" sz="3200" dirty="0"/>
           </a:p>
@@ -7229,7 +7586,7 @@
         <p:spPr>
           <a:xfrm>
             <a:off x="1026941" y="1690688"/>
-            <a:ext cx="10522633" cy="2554545"/>
+            <a:ext cx="10522633" cy="1569660"/>
           </a:xfrm>
           <a:prstGeom prst="rect">
             <a:avLst/>
@@ -7250,7 +7607,7 @@
               <a:rPr lang="fr-FR" sz="3200" dirty="0">
                 <a:latin typeface="+mj-lt"/>
               </a:rPr>
-              <a:t>Section entrée des données pour la réservation</a:t>
+              <a:t>Section modification de la réservation avec les conditions</a:t>
             </a:r>
           </a:p>
           <a:p>
@@ -7262,7 +7619,7 @@
               <a:rPr lang="fr-FR" sz="3200" dirty="0">
                 <a:latin typeface="+mj-lt"/>
               </a:rPr>
-              <a:t>Section avantage du service de réservation de son propre bus </a:t>
+              <a:t>Section Annulation de la réservation avec les conditions</a:t>
             </a:r>
           </a:p>
           <a:p>
@@ -7274,31 +7631,7 @@
               <a:rPr lang="fr-FR" sz="3200" dirty="0">
                 <a:latin typeface="+mj-lt"/>
               </a:rPr>
-              <a:t>Section témoignage des anciens clients</a:t>
-            </a:r>
-          </a:p>
-          <a:p>
-            <a:pPr marL="285750" indent="-285750">
-              <a:buFont typeface="Arial" panose="020B0604020202020204" pitchFamily="34" charset="0"/>
-              <a:buChar char="•"/>
-            </a:pPr>
-            <a:r>
-              <a:rPr lang="fr-FR" sz="3200" dirty="0">
-                <a:latin typeface="+mj-lt"/>
-              </a:rPr>
-              <a:t>Section comment ça marche </a:t>
-            </a:r>
-          </a:p>
-          <a:p>
-            <a:pPr marL="285750" indent="-285750">
-              <a:buFont typeface="Arial" panose="020B0604020202020204" pitchFamily="34" charset="0"/>
-              <a:buChar char="•"/>
-            </a:pPr>
-            <a:r>
-              <a:rPr lang="fr-FR" sz="3200" dirty="0">
-                <a:latin typeface="+mj-lt"/>
-              </a:rPr>
-              <a:t>Le pied de page</a:t>
+              <a:t>Pied de page</a:t>
             </a:r>
           </a:p>
         </p:txBody>
@@ -7306,7 +7639,7 @@
     </p:spTree>
     <p:extLst>
       <p:ext uri="{BB962C8B-B14F-4D97-AF65-F5344CB8AC3E}">
-        <p14:creationId xmlns:p14="http://schemas.microsoft.com/office/powerpoint/2010/main" val="2535262240"/>
+        <p14:creationId xmlns:p14="http://schemas.microsoft.com/office/powerpoint/2010/main" val="3364710369"/>
       </p:ext>
     </p:extLst>
   </p:cSld>
@@ -7322,7 +7655,7 @@
     <p:bg>
       <p:bgPr>
         <a:solidFill>
-          <a:srgbClr val="00B0F0"/>
+          <a:srgbClr val="FFC000"/>
         </a:solidFill>
         <a:effectLst/>
       </p:bgPr>
@@ -7373,14 +7706,14 @@
               <a:rPr lang="fr-FR" altLang="fr-FR" sz="3200" dirty="0">
                 <a:cs typeface="Times New Roman" panose="02020603050405020304" pitchFamily="18" charset="0"/>
               </a:rPr>
-              <a:t>L’entreprise </a:t>
+              <a:t>Services izyGO </a:t>
             </a:r>
             <a:r>
               <a:rPr lang="fr-FR" altLang="fr-FR" sz="3200" dirty="0">
                 <a:ea typeface="Calibri" panose="020F0502020204030204" pitchFamily="34" charset="0"/>
                 <a:cs typeface="Times New Roman" panose="02020603050405020304" pitchFamily="18" charset="0"/>
               </a:rPr>
-              <a:t>: A propos</a:t>
+              <a:t>: Points de ventes</a:t>
             </a:r>
             <a:endParaRPr lang="fr-FR" sz="3200" dirty="0"/>
           </a:p>
@@ -7401,7 +7734,7 @@
         <p:spPr>
           <a:xfrm>
             <a:off x="1026941" y="1690688"/>
-            <a:ext cx="10522633" cy="2062103"/>
+            <a:ext cx="10522633" cy="1569660"/>
           </a:xfrm>
           <a:prstGeom prst="rect">
             <a:avLst/>
@@ -7422,7 +7755,7 @@
               <a:rPr lang="fr-FR" sz="3200" dirty="0">
                 <a:latin typeface="+mj-lt"/>
               </a:rPr>
-              <a:t>Section présentation izyGO</a:t>
+              <a:t>Section présentation rapide des principaux points de ventes</a:t>
             </a:r>
           </a:p>
           <a:p>
@@ -7434,7 +7767,7 @@
               <a:rPr lang="fr-FR" sz="3200" dirty="0">
                 <a:latin typeface="+mj-lt"/>
               </a:rPr>
-              <a:t>Section chiffres clés</a:t>
+              <a:t>Section recherche de points de ventes avec slider maps</a:t>
             </a:r>
           </a:p>
           <a:p>
@@ -7446,18 +7779,6 @@
               <a:rPr lang="fr-FR" sz="3200" dirty="0">
                 <a:latin typeface="+mj-lt"/>
               </a:rPr>
-              <a:t>Section fondateurs</a:t>
-            </a:r>
-          </a:p>
-          <a:p>
-            <a:pPr marL="285750" indent="-285750">
-              <a:buFont typeface="Arial" panose="020B0604020202020204" pitchFamily="34" charset="0"/>
-              <a:buChar char="•"/>
-            </a:pPr>
-            <a:r>
-              <a:rPr lang="fr-FR" sz="3200" dirty="0">
-                <a:latin typeface="+mj-lt"/>
-              </a:rPr>
               <a:t>Le pied de page</a:t>
             </a:r>
           </a:p>
@@ -7466,7 +7787,7 @@
     </p:spTree>
     <p:extLst>
       <p:ext uri="{BB962C8B-B14F-4D97-AF65-F5344CB8AC3E}">
-        <p14:creationId xmlns:p14="http://schemas.microsoft.com/office/powerpoint/2010/main" val="2641649781"/>
+        <p14:creationId xmlns:p14="http://schemas.microsoft.com/office/powerpoint/2010/main" val="2367907844"/>
       </p:ext>
     </p:extLst>
   </p:cSld>

</xml_diff>